<commit_message>
More work on recommendations.Rmd in data-viz-03
</commit_message>
<xml_diff>
--- a/data-viz-03/component/recommendations-linegraphs.pptx
+++ b/data-viz-03/component/recommendations-linegraphs.pptx
@@ -5,7 +5,7 @@
     <p:sldMasterId id="2147483648" r:id="rId1"/>
   </p:sldMasterIdLst>
   <p:notesMasterIdLst>
-    <p:NotesMasterId r:id="rId14"/>
+    <p:NotesMasterId r:id="rId9"/>
   </p:notesMasterIdLst>
   <p:sldIdLst>
     <p:sldId id="256" r:id="rId2"/>
@@ -15,11 +15,6 @@
     <p:sldId id="260" r:id="rId6"/>
     <p:sldId id="261" r:id="rId7"/>
     <p:sldId id="262" r:id="rId8"/>
-    <p:sldId id="263" r:id="rId9"/>
-    <p:sldId id="264" r:id="rId10"/>
-    <p:sldId id="265" r:id="rId11"/>
-    <p:sldId id="266" r:id="rId12"/>
-    <p:sldId id="267" r:id="rId13"/>
   </p:sldIdLst>
   <p:sldSz cx="9144000" cy="6858000" type="screen4x3"/>
   <p:notesSz cx="6858000" cy="9144000"/>
@@ -886,7 +881,7 @@
           <a:p>
             <a:fld id="{18BDFEC3-8487-43E8-A154-7C12CBC1FFF2}" type="slidenum">
               <a:rPr lang="en-US"/>
-              <a:t>3</a:t>
+              <a:t>2</a:t>
             </a:fld>
             <a:endParaRPr lang="en-US"/>
           </a:p>
@@ -946,6 +941,150 @@
             </a:pPr>
             <a:r>
               <a:rPr/>
+              <a:t>This</a:t>
+            </a:r>
+            <a:r>
+              <a:rPr/>
+              <a:t> </a:t>
+            </a:r>
+            <a:r>
+              <a:rPr/>
+              <a:t>graph</a:t>
+            </a:r>
+            <a:r>
+              <a:rPr/>
+              <a:t> </a:t>
+            </a:r>
+            <a:r>
+              <a:rPr/>
+              <a:t>shows</a:t>
+            </a:r>
+            <a:r>
+              <a:rPr/>
+              <a:t> </a:t>
+            </a:r>
+            <a:r>
+              <a:rPr/>
+              <a:t>error</a:t>
+            </a:r>
+            <a:r>
+              <a:rPr/>
+              <a:t> </a:t>
+            </a:r>
+            <a:r>
+              <a:rPr/>
+              <a:t>bars</a:t>
+            </a:r>
+            <a:r>
+              <a:rPr/>
+              <a:t> </a:t>
+            </a:r>
+            <a:r>
+              <a:rPr/>
+              <a:t>for</a:t>
+            </a:r>
+            <a:r>
+              <a:rPr/>
+              <a:t> </a:t>
+            </a:r>
+            <a:r>
+              <a:rPr/>
+              <a:t>the</a:t>
+            </a:r>
+            <a:r>
+              <a:rPr/>
+              <a:t> </a:t>
+            </a:r>
+            <a:r>
+              <a:rPr/>
+              <a:t>average</a:t>
+            </a:r>
+            <a:r>
+              <a:rPr/>
+              <a:t> </a:t>
+            </a:r>
+            <a:r>
+              <a:rPr/>
+              <a:t>price</a:t>
+            </a:r>
+            <a:r>
+              <a:rPr/>
+              <a:t> </a:t>
+            </a:r>
+            <a:r>
+              <a:rPr/>
+              <a:t>of</a:t>
+            </a:r>
+            <a:r>
+              <a:rPr/>
+              <a:t> </a:t>
+            </a:r>
+            <a:r>
+              <a:rPr/>
+              <a:t>a</a:t>
+            </a:r>
+            <a:r>
+              <a:rPr/>
+              <a:t> </a:t>
+            </a:r>
+            <a:r>
+              <a:rPr/>
+              <a:t>house</a:t>
+            </a:r>
+            <a:r>
+              <a:rPr/>
+              <a:t> </a:t>
+            </a:r>
+            <a:r>
+              <a:rPr/>
+              <a:t>given</a:t>
+            </a:r>
+            <a:r>
+              <a:rPr/>
+              <a:t> </a:t>
+            </a:r>
+            <a:r>
+              <a:rPr/>
+              <a:t>a</a:t>
+            </a:r>
+            <a:r>
+              <a:rPr/>
+              <a:t> </a:t>
+            </a:r>
+            <a:r>
+              <a:rPr/>
+              <a:t>fixed</a:t>
+            </a:r>
+            <a:r>
+              <a:rPr/>
+              <a:t> </a:t>
+            </a:r>
+            <a:r>
+              <a:rPr/>
+              <a:t>number</a:t>
+            </a:r>
+            <a:r>
+              <a:rPr/>
+              <a:t> </a:t>
+            </a:r>
+            <a:r>
+              <a:rPr/>
+              <a:t>of</a:t>
+            </a:r>
+            <a:r>
+              <a:rPr/>
+              <a:t> </a:t>
+            </a:r>
+            <a:r>
+              <a:rPr/>
+              <a:t>bedrooms.</a:t>
+            </a:r>
+            <a:r>
+              <a:rPr/>
+              <a:t> </a:t>
+            </a:r>
+            <a:r>
+              <a:rPr/>
               <a:t>There</a:t>
             </a:r>
             <a:r>
@@ -962,6 +1101,262 @@
             </a:r>
             <a:r>
               <a:rPr/>
+              <a:t>indeed</a:t>
+            </a:r>
+            <a:r>
+              <a:rPr/>
+              <a:t> </a:t>
+            </a:r>
+            <a:r>
+              <a:rPr/>
+              <a:t>an</a:t>
+            </a:r>
+            <a:r>
+              <a:rPr/>
+              <a:t> </a:t>
+            </a:r>
+            <a:r>
+              <a:rPr/>
+              <a:t>upward</a:t>
+            </a:r>
+            <a:r>
+              <a:rPr/>
+              <a:t> </a:t>
+            </a:r>
+            <a:r>
+              <a:rPr/>
+              <a:t>trend</a:t>
+            </a:r>
+            <a:r>
+              <a:rPr/>
+              <a:t> </a:t>
+            </a:r>
+            <a:r>
+              <a:rPr/>
+              <a:t>in</a:t>
+            </a:r>
+            <a:r>
+              <a:rPr/>
+              <a:t> </a:t>
+            </a:r>
+            <a:r>
+              <a:rPr/>
+              <a:t>prices.</a:t>
+            </a:r>
+            <a:r>
+              <a:rPr/>
+              <a:t> </a:t>
+            </a:r>
+            <a:r>
+              <a:rPr/>
+              <a:t>The</a:t>
+            </a:r>
+            <a:r>
+              <a:rPr/>
+              <a:t> </a:t>
+            </a:r>
+            <a:r>
+              <a:rPr/>
+              <a:t>more</a:t>
+            </a:r>
+            <a:r>
+              <a:rPr/>
+              <a:t> </a:t>
+            </a:r>
+            <a:r>
+              <a:rPr/>
+              <a:t>bedrooms</a:t>
+            </a:r>
+            <a:r>
+              <a:rPr/>
+              <a:t> </a:t>
+            </a:r>
+            <a:r>
+              <a:rPr/>
+              <a:t>you</a:t>
+            </a:r>
+            <a:r>
+              <a:rPr/>
+              <a:t> </a:t>
+            </a:r>
+            <a:r>
+              <a:rPr/>
+              <a:t>have,</a:t>
+            </a:r>
+            <a:r>
+              <a:rPr/>
+              <a:t> </a:t>
+            </a:r>
+            <a:r>
+              <a:rPr/>
+              <a:t>the</a:t>
+            </a:r>
+            <a:r>
+              <a:rPr/>
+              <a:t> </a:t>
+            </a:r>
+            <a:r>
+              <a:rPr/>
+              <a:t>higher</a:t>
+            </a:r>
+            <a:r>
+              <a:rPr/>
+              <a:t> </a:t>
+            </a:r>
+            <a:r>
+              <a:rPr/>
+              <a:t>the</a:t>
+            </a:r>
+            <a:r>
+              <a:rPr/>
+              <a:t> </a:t>
+            </a:r>
+            <a:r>
+              <a:rPr/>
+              <a:t>average</a:t>
+            </a:r>
+            <a:r>
+              <a:rPr/>
+              <a:t> </a:t>
+            </a:r>
+            <a:r>
+              <a:rPr/>
+              <a:t>price.</a:t>
+            </a:r>
+            <a:r>
+              <a:rPr/>
+              <a:t> </a:t>
+            </a:r>
+            <a:r>
+              <a:rPr/>
+              <a:t>But</a:t>
+            </a:r>
+            <a:r>
+              <a:rPr/>
+              <a:t> </a:t>
+            </a:r>
+            <a:r>
+              <a:rPr/>
+              <a:t>these</a:t>
+            </a:r>
+            <a:r>
+              <a:rPr/>
+              <a:t> </a:t>
+            </a:r>
+            <a:r>
+              <a:rPr/>
+              <a:t>error</a:t>
+            </a:r>
+            <a:r>
+              <a:rPr/>
+              <a:t> </a:t>
+            </a:r>
+            <a:r>
+              <a:rPr/>
+              <a:t>bars,</a:t>
+            </a:r>
+            <a:r>
+              <a:rPr/>
+              <a:t> </a:t>
+            </a:r>
+            <a:r>
+              <a:rPr/>
+              <a:t>equal</a:t>
+            </a:r>
+            <a:r>
+              <a:rPr/>
+              <a:t> </a:t>
+            </a:r>
+            <a:r>
+              <a:rPr/>
+              <a:t>to</a:t>
+            </a:r>
+            <a:r>
+              <a:rPr/>
+              <a:t> </a:t>
+            </a:r>
+            <a:r>
+              <a:rPr/>
+              <a:t>plus</a:t>
+            </a:r>
+            <a:r>
+              <a:rPr/>
+              <a:t> </a:t>
+            </a:r>
+            <a:r>
+              <a:rPr/>
+              <a:t>or</a:t>
+            </a:r>
+            <a:r>
+              <a:rPr/>
+              <a:t> </a:t>
+            </a:r>
+            <a:r>
+              <a:rPr/>
+              <a:t>minus</a:t>
+            </a:r>
+            <a:r>
+              <a:rPr/>
+              <a:t> </a:t>
+            </a:r>
+            <a:r>
+              <a:rPr/>
+              <a:t>one</a:t>
+            </a:r>
+            <a:r>
+              <a:rPr/>
+              <a:t> </a:t>
+            </a:r>
+            <a:r>
+              <a:rPr/>
+              <a:t>standard</a:t>
+            </a:r>
+            <a:r>
+              <a:rPr/>
+              <a:t> </a:t>
+            </a:r>
+            <a:r>
+              <a:rPr/>
+              <a:t>deviation,</a:t>
+            </a:r>
+            <a:r>
+              <a:rPr/>
+              <a:t> </a:t>
+            </a:r>
+            <a:r>
+              <a:rPr/>
+              <a:t>emphasize</a:t>
+            </a:r>
+            <a:r>
+              <a:rPr/>
+              <a:t> </a:t>
+            </a:r>
+            <a:r>
+              <a:rPr/>
+              <a:t>that</a:t>
+            </a:r>
+            <a:r>
+              <a:rPr/>
+              <a:t> </a:t>
+            </a:r>
+            <a:r>
+              <a:rPr/>
+              <a:t>there</a:t>
+            </a:r>
+            <a:r>
+              <a:rPr/>
+              <a:t> </a:t>
+            </a:r>
+            <a:r>
+              <a:rPr/>
+              <a:t>is</a:t>
+            </a:r>
+            <a:r>
+              <a:rPr/>
+              <a:t> </a:t>
+            </a:r>
+            <a:r>
+              <a:rPr/>
               <a:t>a</a:t>
             </a:r>
             <a:r>
@@ -970,31 +1365,23 @@
             </a:r>
             <a:r>
               <a:rPr/>
-              <a:t>clear</a:t>
-            </a:r>
-            <a:r>
-              <a:rPr/>
-              <a:t> </a:t>
-            </a:r>
-            <a:r>
-              <a:rPr/>
-              <a:t>and</a:t>
-            </a:r>
-            <a:r>
-              <a:rPr/>
-              <a:t> </a:t>
-            </a:r>
-            <a:r>
-              <a:rPr/>
-              <a:t>consistent</a:t>
-            </a:r>
-            <a:r>
-              <a:rPr/>
-              <a:t> </a:t>
-            </a:r>
-            <a:r>
-              <a:rPr/>
-              <a:t>trend</a:t>
+              <a:t>lot</a:t>
+            </a:r>
+            <a:r>
+              <a:rPr/>
+              <a:t> </a:t>
+            </a:r>
+            <a:r>
+              <a:rPr/>
+              <a:t>of</a:t>
+            </a:r>
+            <a:r>
+              <a:rPr/>
+              <a:t> </a:t>
+            </a:r>
+            <a:r>
+              <a:rPr/>
+              <a:t>overlap</a:t>
             </a:r>
             <a:r>
               <a:rPr/>
@@ -1010,103 +1397,15 @@
             </a:r>
             <a:r>
               <a:rPr/>
-              <a:t>the</a:t>
-            </a:r>
-            <a:r>
-              <a:rPr/>
-              <a:t> </a:t>
-            </a:r>
-            <a:r>
-              <a:rPr/>
-              <a:t>average</a:t>
-            </a:r>
-            <a:r>
-              <a:rPr/>
-              <a:t> </a:t>
-            </a:r>
-            <a:r>
-              <a:rPr/>
-              <a:t>price.</a:t>
-            </a:r>
-            <a:r>
-              <a:rPr/>
-              <a:t> </a:t>
-            </a:r>
-            <a:r>
-              <a:rPr/>
-              <a:t>As</a:t>
-            </a:r>
-            <a:r>
-              <a:rPr/>
-              <a:t> </a:t>
-            </a:r>
-            <a:r>
-              <a:rPr/>
-              <a:t>the</a:t>
-            </a:r>
-            <a:r>
-              <a:rPr/>
-              <a:t> </a:t>
-            </a:r>
-            <a:r>
-              <a:rPr/>
-              <a:t>number</a:t>
-            </a:r>
-            <a:r>
-              <a:rPr/>
-              <a:t> </a:t>
-            </a:r>
-            <a:r>
-              <a:rPr/>
-              <a:t>of</a:t>
-            </a:r>
-            <a:r>
-              <a:rPr/>
-              <a:t> </a:t>
-            </a:r>
-            <a:r>
-              <a:rPr/>
-              <a:t>bedrooms</a:t>
-            </a:r>
-            <a:r>
-              <a:rPr/>
-              <a:t> </a:t>
-            </a:r>
-            <a:r>
-              <a:rPr/>
-              <a:t>increase,</a:t>
-            </a:r>
-            <a:r>
-              <a:rPr/>
-              <a:t> </a:t>
-            </a:r>
-            <a:r>
-              <a:rPr/>
-              <a:t>the</a:t>
-            </a:r>
-            <a:r>
-              <a:rPr/>
-              <a:t> </a:t>
-            </a:r>
-            <a:r>
-              <a:rPr/>
-              <a:t>average</a:t>
-            </a:r>
-            <a:r>
-              <a:rPr/>
-              <a:t> </a:t>
-            </a:r>
-            <a:r>
-              <a:rPr/>
-              <a:t>price</a:t>
-            </a:r>
-            <a:r>
-              <a:rPr/>
-              <a:t> </a:t>
-            </a:r>
-            <a:r>
-              <a:rPr/>
-              <a:t>increases.</a:t>
+              <a:t>individual</a:t>
+            </a:r>
+            <a:r>
+              <a:rPr/>
+              <a:t> </a:t>
+            </a:r>
+            <a:r>
+              <a:rPr/>
+              <a:t>prices.</a:t>
             </a:r>
           </a:p>
         </p:txBody>
@@ -1128,7 +1427,7 @@
           <a:p>
             <a:fld id="{18BDFEC3-8487-43E8-A154-7C12CBC1FFF2}" type="slidenum">
               <a:rPr lang="en-US"/>
-              <a:t>5</a:t>
+              <a:t>3</a:t>
             </a:fld>
             <a:endParaRPr lang="en-US"/>
           </a:p>
@@ -1188,7 +1487,7 @@
             </a:pPr>
             <a:r>
               <a:rPr/>
-              <a:t>There</a:t>
+              <a:t>Here</a:t>
             </a:r>
             <a:r>
               <a:rPr/>
@@ -1204,6 +1503,430 @@
             </a:r>
             <a:r>
               <a:rPr/>
+              <a:t>the</a:t>
+            </a:r>
+            <a:r>
+              <a:rPr/>
+              <a:t> </a:t>
+            </a:r>
+            <a:r>
+              <a:rPr/>
+              <a:t>same</a:t>
+            </a:r>
+            <a:r>
+              <a:rPr/>
+              <a:t> </a:t>
+            </a:r>
+            <a:r>
+              <a:rPr/>
+              <a:t>graph,</a:t>
+            </a:r>
+            <a:r>
+              <a:rPr/>
+              <a:t> </a:t>
+            </a:r>
+            <a:r>
+              <a:rPr/>
+              <a:t>but</a:t>
+            </a:r>
+            <a:r>
+              <a:rPr/>
+              <a:t> </a:t>
+            </a:r>
+            <a:r>
+              <a:rPr/>
+              <a:t>with</a:t>
+            </a:r>
+            <a:r>
+              <a:rPr/>
+              <a:t> </a:t>
+            </a:r>
+            <a:r>
+              <a:rPr/>
+              <a:t>the</a:t>
+            </a:r>
+            <a:r>
+              <a:rPr/>
+              <a:t> </a:t>
+            </a:r>
+            <a:r>
+              <a:rPr/>
+              <a:t>error</a:t>
+            </a:r>
+            <a:r>
+              <a:rPr/>
+              <a:t> </a:t>
+            </a:r>
+            <a:r>
+              <a:rPr/>
+              <a:t>bar</a:t>
+            </a:r>
+            <a:r>
+              <a:rPr/>
+              <a:t> </a:t>
+            </a:r>
+            <a:r>
+              <a:rPr/>
+              <a:t>representing</a:t>
+            </a:r>
+            <a:r>
+              <a:rPr/>
+              <a:t> </a:t>
+            </a:r>
+            <a:r>
+              <a:rPr/>
+              <a:t>plus</a:t>
+            </a:r>
+            <a:r>
+              <a:rPr/>
+              <a:t> </a:t>
+            </a:r>
+            <a:r>
+              <a:rPr/>
+              <a:t>or</a:t>
+            </a:r>
+            <a:r>
+              <a:rPr/>
+              <a:t> </a:t>
+            </a:r>
+            <a:r>
+              <a:rPr/>
+              <a:t>minus</a:t>
+            </a:r>
+            <a:r>
+              <a:rPr/>
+              <a:t> </a:t>
+            </a:r>
+            <a:r>
+              <a:rPr/>
+              <a:t>one</a:t>
+            </a:r>
+            <a:r>
+              <a:rPr/>
+              <a:t> </a:t>
+            </a:r>
+            <a:r>
+              <a:rPr/>
+              <a:t>standard</a:t>
+            </a:r>
+            <a:r>
+              <a:rPr/>
+              <a:t> </a:t>
+            </a:r>
+            <a:r>
+              <a:rPr/>
+              <a:t>error.</a:t>
+            </a:r>
+            <a:r>
+              <a:rPr/>
+              <a:t> </a:t>
+            </a:r>
+            <a:r>
+              <a:rPr/>
+              <a:t>The</a:t>
+            </a:r>
+            <a:r>
+              <a:rPr/>
+              <a:t> </a:t>
+            </a:r>
+            <a:r>
+              <a:rPr/>
+              <a:t>standard</a:t>
+            </a:r>
+            <a:r>
+              <a:rPr/>
+              <a:t> </a:t>
+            </a:r>
+            <a:r>
+              <a:rPr/>
+              <a:t>error</a:t>
+            </a:r>
+            <a:r>
+              <a:rPr/>
+              <a:t> </a:t>
+            </a:r>
+            <a:r>
+              <a:rPr/>
+              <a:t>is</a:t>
+            </a:r>
+            <a:r>
+              <a:rPr/>
+              <a:t> </a:t>
+            </a:r>
+            <a:r>
+              <a:rPr/>
+              <a:t>the</a:t>
+            </a:r>
+            <a:r>
+              <a:rPr/>
+              <a:t> </a:t>
+            </a:r>
+            <a:r>
+              <a:rPr/>
+              <a:t>standard</a:t>
+            </a:r>
+            <a:r>
+              <a:rPr/>
+              <a:t> </a:t>
+            </a:r>
+            <a:r>
+              <a:rPr/>
+              <a:t>deviation</a:t>
+            </a:r>
+            <a:r>
+              <a:rPr/>
+              <a:t> </a:t>
+            </a:r>
+            <a:r>
+              <a:rPr/>
+              <a:t>divided</a:t>
+            </a:r>
+            <a:r>
+              <a:rPr/>
+              <a:t> </a:t>
+            </a:r>
+            <a:r>
+              <a:rPr/>
+              <a:t>by</a:t>
+            </a:r>
+            <a:r>
+              <a:rPr/>
+              <a:t> </a:t>
+            </a:r>
+            <a:r>
+              <a:rPr/>
+              <a:t>the</a:t>
+            </a:r>
+            <a:r>
+              <a:rPr/>
+              <a:t> </a:t>
+            </a:r>
+            <a:r>
+              <a:rPr/>
+              <a:t>square</a:t>
+            </a:r>
+            <a:r>
+              <a:rPr/>
+              <a:t> </a:t>
+            </a:r>
+            <a:r>
+              <a:rPr/>
+              <a:t>root</a:t>
+            </a:r>
+            <a:r>
+              <a:rPr/>
+              <a:t> </a:t>
+            </a:r>
+            <a:r>
+              <a:rPr/>
+              <a:t>of</a:t>
+            </a:r>
+            <a:r>
+              <a:rPr/>
+              <a:t> </a:t>
+            </a:r>
+            <a:r>
+              <a:rPr/>
+              <a:t>the</a:t>
+            </a:r>
+            <a:r>
+              <a:rPr/>
+              <a:t> </a:t>
+            </a:r>
+            <a:r>
+              <a:rPr/>
+              <a:t>sample</a:t>
+            </a:r>
+            <a:r>
+              <a:rPr/>
+              <a:t> </a:t>
+            </a:r>
+            <a:r>
+              <a:rPr/>
+              <a:t>size.</a:t>
+            </a:r>
+            <a:r>
+              <a:rPr/>
+              <a:t> </a:t>
+            </a:r>
+            <a:r>
+              <a:rPr/>
+              <a:t>It</a:t>
+            </a:r>
+            <a:r>
+              <a:rPr/>
+              <a:t> </a:t>
+            </a:r>
+            <a:r>
+              <a:rPr/>
+              <a:t>shows</a:t>
+            </a:r>
+            <a:r>
+              <a:rPr/>
+              <a:t> </a:t>
+            </a:r>
+            <a:r>
+              <a:rPr/>
+              <a:t>how</a:t>
+            </a:r>
+            <a:r>
+              <a:rPr/>
+              <a:t> </a:t>
+            </a:r>
+            <a:r>
+              <a:rPr/>
+              <a:t>variable</a:t>
+            </a:r>
+            <a:r>
+              <a:rPr/>
+              <a:t> </a:t>
+            </a:r>
+            <a:r>
+              <a:rPr/>
+              <a:t>the</a:t>
+            </a:r>
+            <a:r>
+              <a:rPr/>
+              <a:t> </a:t>
+            </a:r>
+            <a:r>
+              <a:rPr/>
+              <a:t>mean</a:t>
+            </a:r>
+            <a:r>
+              <a:rPr/>
+              <a:t> </a:t>
+            </a:r>
+            <a:r>
+              <a:rPr/>
+              <a:t>is</a:t>
+            </a:r>
+            <a:r>
+              <a:rPr/>
+              <a:t> </a:t>
+            </a:r>
+            <a:r>
+              <a:rPr/>
+              <a:t>rather</a:t>
+            </a:r>
+            <a:r>
+              <a:rPr/>
+              <a:t> </a:t>
+            </a:r>
+            <a:r>
+              <a:rPr/>
+              <a:t>than</a:t>
+            </a:r>
+            <a:r>
+              <a:rPr/>
+              <a:t> </a:t>
+            </a:r>
+            <a:r>
+              <a:rPr/>
+              <a:t>how</a:t>
+            </a:r>
+            <a:r>
+              <a:rPr/>
+              <a:t> </a:t>
+            </a:r>
+            <a:r>
+              <a:rPr/>
+              <a:t>variable</a:t>
+            </a:r>
+            <a:r>
+              <a:rPr/>
+              <a:t> </a:t>
+            </a:r>
+            <a:r>
+              <a:rPr/>
+              <a:t>an</a:t>
+            </a:r>
+            <a:r>
+              <a:rPr/>
+              <a:t> </a:t>
+            </a:r>
+            <a:r>
+              <a:rPr/>
+              <a:t>individual</a:t>
+            </a:r>
+            <a:r>
+              <a:rPr/>
+              <a:t> </a:t>
+            </a:r>
+            <a:r>
+              <a:rPr/>
+              <a:t>observation</a:t>
+            </a:r>
+            <a:r>
+              <a:rPr/>
+              <a:t> </a:t>
+            </a:r>
+            <a:r>
+              <a:rPr/>
+              <a:t>is.</a:t>
+            </a:r>
+            <a:r>
+              <a:rPr/>
+              <a:t> </a:t>
+            </a:r>
+            <a:r>
+              <a:rPr/>
+              <a:t>This</a:t>
+            </a:r>
+            <a:r>
+              <a:rPr/>
+              <a:t> </a:t>
+            </a:r>
+            <a:r>
+              <a:rPr/>
+              <a:t>picture</a:t>
+            </a:r>
+            <a:r>
+              <a:rPr/>
+              <a:t> </a:t>
+            </a:r>
+            <a:r>
+              <a:rPr/>
+              <a:t>is</a:t>
+            </a:r>
+            <a:r>
+              <a:rPr/>
+              <a:t> </a:t>
+            </a:r>
+            <a:r>
+              <a:rPr/>
+              <a:t>quite</a:t>
+            </a:r>
+            <a:r>
+              <a:rPr/>
+              <a:t> </a:t>
+            </a:r>
+            <a:r>
+              <a:rPr/>
+              <a:t>different,</a:t>
+            </a:r>
+            <a:r>
+              <a:rPr/>
+              <a:t> </a:t>
+            </a:r>
+            <a:r>
+              <a:rPr/>
+              <a:t>and</a:t>
+            </a:r>
+            <a:r>
+              <a:rPr/>
+              <a:t> </a:t>
+            </a:r>
+            <a:r>
+              <a:rPr/>
+              <a:t>implies</a:t>
+            </a:r>
+            <a:r>
+              <a:rPr/>
+              <a:t> </a:t>
+            </a:r>
+            <a:r>
+              <a:rPr/>
               <a:t>a</a:t>
             </a:r>
             <a:r>
@@ -1212,31 +1935,71 @@
             </a:r>
             <a:r>
               <a:rPr/>
-              <a:t>clear</a:t>
-            </a:r>
-            <a:r>
-              <a:rPr/>
-              <a:t> </a:t>
-            </a:r>
-            <a:r>
-              <a:rPr/>
-              <a:t>and</a:t>
-            </a:r>
-            <a:r>
-              <a:rPr/>
-              <a:t> </a:t>
-            </a:r>
-            <a:r>
-              <a:rPr/>
-              <a:t>consistent</a:t>
-            </a:r>
-            <a:r>
-              <a:rPr/>
-              <a:t> </a:t>
-            </a:r>
-            <a:r>
-              <a:rPr/>
-              <a:t>trend</a:t>
+              <a:t>much</a:t>
+            </a:r>
+            <a:r>
+              <a:rPr/>
+              <a:t> </a:t>
+            </a:r>
+            <a:r>
+              <a:rPr/>
+              <a:t>stronger</a:t>
+            </a:r>
+            <a:r>
+              <a:rPr/>
+              <a:t> </a:t>
+            </a:r>
+            <a:r>
+              <a:rPr/>
+              <a:t>trend.</a:t>
+            </a:r>
+            <a:r>
+              <a:rPr/>
+              <a:t> </a:t>
+            </a:r>
+            <a:r>
+              <a:rPr/>
+              <a:t>Which</a:t>
+            </a:r>
+            <a:r>
+              <a:rPr/>
+              <a:t> </a:t>
+            </a:r>
+            <a:r>
+              <a:rPr/>
+              <a:t>graph</a:t>
+            </a:r>
+            <a:r>
+              <a:rPr/>
+              <a:t> </a:t>
+            </a:r>
+            <a:r>
+              <a:rPr/>
+              <a:t>is</a:t>
+            </a:r>
+            <a:r>
+              <a:rPr/>
+              <a:t> </a:t>
+            </a:r>
+            <a:r>
+              <a:rPr/>
+              <a:t>better?</a:t>
+            </a:r>
+            <a:r>
+              <a:rPr/>
+              <a:t> </a:t>
+            </a:r>
+            <a:r>
+              <a:rPr/>
+              <a:t>Well,</a:t>
+            </a:r>
+            <a:r>
+              <a:rPr/>
+              <a:t> </a:t>
+            </a:r>
+            <a:r>
+              <a:rPr/>
+              <a:t>neither</a:t>
             </a:r>
             <a:r>
               <a:rPr/>
@@ -1252,103 +2015,15 @@
             </a:r>
             <a:r>
               <a:rPr/>
-              <a:t>the</a:t>
-            </a:r>
-            <a:r>
-              <a:rPr/>
-              <a:t> </a:t>
-            </a:r>
-            <a:r>
-              <a:rPr/>
-              <a:t>average</a:t>
-            </a:r>
-            <a:r>
-              <a:rPr/>
-              <a:t> </a:t>
-            </a:r>
-            <a:r>
-              <a:rPr/>
-              <a:t>price.</a:t>
-            </a:r>
-            <a:r>
-              <a:rPr/>
-              <a:t> </a:t>
-            </a:r>
-            <a:r>
-              <a:rPr/>
-              <a:t>As</a:t>
-            </a:r>
-            <a:r>
-              <a:rPr/>
-              <a:t> </a:t>
-            </a:r>
-            <a:r>
-              <a:rPr/>
-              <a:t>the</a:t>
-            </a:r>
-            <a:r>
-              <a:rPr/>
-              <a:t> </a:t>
-            </a:r>
-            <a:r>
-              <a:rPr/>
-              <a:t>number</a:t>
-            </a:r>
-            <a:r>
-              <a:rPr/>
-              <a:t> </a:t>
-            </a:r>
-            <a:r>
-              <a:rPr/>
-              <a:t>of</a:t>
-            </a:r>
-            <a:r>
-              <a:rPr/>
-              <a:t> </a:t>
-            </a:r>
-            <a:r>
-              <a:rPr/>
-              <a:t>bedrooms</a:t>
-            </a:r>
-            <a:r>
-              <a:rPr/>
-              <a:t> </a:t>
-            </a:r>
-            <a:r>
-              <a:rPr/>
-              <a:t>increase,</a:t>
-            </a:r>
-            <a:r>
-              <a:rPr/>
-              <a:t> </a:t>
-            </a:r>
-            <a:r>
-              <a:rPr/>
-              <a:t>the</a:t>
-            </a:r>
-            <a:r>
-              <a:rPr/>
-              <a:t> </a:t>
-            </a:r>
-            <a:r>
-              <a:rPr/>
-              <a:t>average</a:t>
-            </a:r>
-            <a:r>
-              <a:rPr/>
-              <a:t> </a:t>
-            </a:r>
-            <a:r>
-              <a:rPr/>
-              <a:t>price</a:t>
-            </a:r>
-            <a:r>
-              <a:rPr/>
-              <a:t> </a:t>
-            </a:r>
-            <a:r>
-              <a:rPr/>
-              <a:t>increases.</a:t>
+              <a:t>my</a:t>
+            </a:r>
+            <a:r>
+              <a:rPr/>
+              <a:t> </a:t>
+            </a:r>
+            <a:r>
+              <a:rPr/>
+              <a:t>opinion.</a:t>
             </a:r>
           </a:p>
         </p:txBody>
@@ -1370,7 +2045,337 @@
           <a:p>
             <a:fld id="{18BDFEC3-8487-43E8-A154-7C12CBC1FFF2}" type="slidenum">
               <a:rPr lang="en-US"/>
-              <a:t>6</a:t>
+              <a:t>4</a:t>
+            </a:fld>
+            <a:endParaRPr lang="en-US"/>
+          </a:p>
+        </p:txBody>
+      </p:sp>
+    </p:spTree>
+  </p:cSld>
+</p:notes>
+</file>
+
+<file path=ppt/notesSlides/notesSlide4.xml><?xml version="1.0" encoding="utf-8"?>
+<p:notes xmlns:a="http://schemas.openxmlformats.org/drawingml/2006/main" xmlns:r="http://schemas.openxmlformats.org/officeDocument/2006/relationships" xmlns:p="http://schemas.openxmlformats.org/presentationml/2006/main">
+  <p:cSld>
+    <p:spTree>
+      <p:nvGrpSpPr>
+        <p:cNvPr id="1" name=""/>
+        <p:cNvGrpSpPr/>
+        <p:nvPr/>
+      </p:nvGrpSpPr>
+      <p:grpSpPr>
+        <a:xfrm>
+          <a:off x="0" y="0"/>
+          <a:ext cx="0" cy="0"/>
+          <a:chOff x="0" y="0"/>
+          <a:chExt cx="0" cy="0"/>
+        </a:xfrm>
+      </p:grpSpPr>
+      <p:sp>
+        <p:nvSpPr>
+          <p:cNvPr id="2" name="Slide Image Placeholder 1"/>
+          <p:cNvSpPr>
+            <a:spLocks noGrp="1" noRot="1" noChangeAspect="1"/>
+          </p:cNvSpPr>
+          <p:nvPr>
+            <p:ph type="sldImg"/>
+          </p:nvPr>
+        </p:nvSpPr>
+        <p:spPr/>
+      </p:sp>
+      <p:sp>
+        <p:nvSpPr>
+          <p:cNvPr id="3" name="Notes Placeholder 2"/>
+          <p:cNvSpPr>
+            <a:spLocks noGrp="1"/>
+          </p:cNvSpPr>
+          <p:nvPr>
+            <p:ph type="body" idx="1"/>
+          </p:nvPr>
+        </p:nvSpPr>
+        <p:spPr/>
+        <p:txBody>
+          <a:bodyPr/>
+          <a:lstStyle/>
+          <a:p>
+            <a:pPr lvl="0" marL="0" indent="0">
+              <a:buNone/>
+            </a:pPr>
+            <a:r>
+              <a:rPr/>
+              <a:t>The</a:t>
+            </a:r>
+            <a:r>
+              <a:rPr/>
+              <a:t> </a:t>
+            </a:r>
+            <a:r>
+              <a:rPr/>
+              <a:t>first</a:t>
+            </a:r>
+            <a:r>
+              <a:rPr/>
+              <a:t> </a:t>
+            </a:r>
+            <a:r>
+              <a:rPr/>
+              <a:t>problem</a:t>
+            </a:r>
+            <a:r>
+              <a:rPr/>
+              <a:t> </a:t>
+            </a:r>
+            <a:r>
+              <a:rPr/>
+              <a:t>with</a:t>
+            </a:r>
+            <a:r>
+              <a:rPr/>
+              <a:t> </a:t>
+            </a:r>
+            <a:r>
+              <a:rPr/>
+              <a:t>error</a:t>
+            </a:r>
+            <a:r>
+              <a:rPr/>
+              <a:t> </a:t>
+            </a:r>
+            <a:r>
+              <a:rPr/>
+              <a:t>bars</a:t>
+            </a:r>
+            <a:r>
+              <a:rPr/>
+              <a:t> </a:t>
+            </a:r>
+            <a:r>
+              <a:rPr/>
+              <a:t>is</a:t>
+            </a:r>
+            <a:r>
+              <a:rPr/>
+              <a:t> </a:t>
+            </a:r>
+            <a:r>
+              <a:rPr/>
+              <a:t>that</a:t>
+            </a:r>
+            <a:r>
+              <a:rPr/>
+              <a:t> </a:t>
+            </a:r>
+            <a:r>
+              <a:rPr/>
+              <a:t>they</a:t>
+            </a:r>
+            <a:r>
+              <a:rPr/>
+              <a:t> </a:t>
+            </a:r>
+            <a:r>
+              <a:rPr/>
+              <a:t>do</a:t>
+            </a:r>
+            <a:r>
+              <a:rPr/>
+              <a:t> </a:t>
+            </a:r>
+            <a:r>
+              <a:rPr/>
+              <a:t>not</a:t>
+            </a:r>
+            <a:r>
+              <a:rPr/>
+              <a:t> </a:t>
+            </a:r>
+            <a:r>
+              <a:rPr/>
+              <a:t>have</a:t>
+            </a:r>
+            <a:r>
+              <a:rPr/>
+              <a:t> </a:t>
+            </a:r>
+            <a:r>
+              <a:rPr/>
+              <a:t>a</a:t>
+            </a:r>
+            <a:r>
+              <a:rPr/>
+              <a:t> </a:t>
+            </a:r>
+            <a:r>
+              <a:rPr/>
+              <a:t>commonly</a:t>
+            </a:r>
+            <a:r>
+              <a:rPr/>
+              <a:t> </a:t>
+            </a:r>
+            <a:r>
+              <a:rPr/>
+              <a:t>agreed</a:t>
+            </a:r>
+            <a:r>
+              <a:rPr/>
+              <a:t> </a:t>
+            </a:r>
+            <a:r>
+              <a:rPr/>
+              <a:t>upon</a:t>
+            </a:r>
+            <a:r>
+              <a:rPr/>
+              <a:t> </a:t>
+            </a:r>
+            <a:r>
+              <a:rPr/>
+              <a:t>definition.</a:t>
+            </a:r>
+            <a:r>
+              <a:rPr/>
+              <a:t> </a:t>
+            </a:r>
+            <a:r>
+              <a:rPr/>
+              <a:t>Is</a:t>
+            </a:r>
+            <a:r>
+              <a:rPr/>
+              <a:t> </a:t>
+            </a:r>
+            <a:r>
+              <a:rPr/>
+              <a:t>it</a:t>
+            </a:r>
+            <a:r>
+              <a:rPr/>
+              <a:t> </a:t>
+            </a:r>
+            <a:r>
+              <a:rPr/>
+              <a:t>plus</a:t>
+            </a:r>
+            <a:r>
+              <a:rPr/>
+              <a:t> </a:t>
+            </a:r>
+            <a:r>
+              <a:rPr/>
+              <a:t>or</a:t>
+            </a:r>
+            <a:r>
+              <a:rPr/>
+              <a:t> </a:t>
+            </a:r>
+            <a:r>
+              <a:rPr/>
+              <a:t>minus</a:t>
+            </a:r>
+            <a:r>
+              <a:rPr/>
+              <a:t> </a:t>
+            </a:r>
+            <a:r>
+              <a:rPr/>
+              <a:t>one</a:t>
+            </a:r>
+            <a:r>
+              <a:rPr/>
+              <a:t> </a:t>
+            </a:r>
+            <a:r>
+              <a:rPr/>
+              <a:t>standard</a:t>
+            </a:r>
+            <a:r>
+              <a:rPr/>
+              <a:t> </a:t>
+            </a:r>
+            <a:r>
+              <a:rPr/>
+              <a:t>deviation</a:t>
+            </a:r>
+            <a:r>
+              <a:rPr/>
+              <a:t> </a:t>
+            </a:r>
+            <a:r>
+              <a:rPr/>
+              <a:t>or</a:t>
+            </a:r>
+            <a:r>
+              <a:rPr/>
+              <a:t> </a:t>
+            </a:r>
+            <a:r>
+              <a:rPr/>
+              <a:t>plus</a:t>
+            </a:r>
+            <a:r>
+              <a:rPr/>
+              <a:t> </a:t>
+            </a:r>
+            <a:r>
+              <a:rPr/>
+              <a:t>or</a:t>
+            </a:r>
+            <a:r>
+              <a:rPr/>
+              <a:t> </a:t>
+            </a:r>
+            <a:r>
+              <a:rPr/>
+              <a:t>minus</a:t>
+            </a:r>
+            <a:r>
+              <a:rPr/>
+              <a:t> </a:t>
+            </a:r>
+            <a:r>
+              <a:rPr/>
+              <a:t>one</a:t>
+            </a:r>
+            <a:r>
+              <a:rPr/>
+              <a:t> </a:t>
+            </a:r>
+            <a:r>
+              <a:rPr/>
+              <a:t>standard</a:t>
+            </a:r>
+            <a:r>
+              <a:rPr/>
+              <a:t> </a:t>
+            </a:r>
+            <a:r>
+              <a:rPr/>
+              <a:t>error?</a:t>
+            </a:r>
+          </a:p>
+        </p:txBody>
+      </p:sp>
+      <p:sp>
+        <p:nvSpPr>
+          <p:cNvPr id="4" name="Slide Number Placeholder 3"/>
+          <p:cNvSpPr>
+            <a:spLocks noGrp="1"/>
+          </p:cNvSpPr>
+          <p:nvPr>
+            <p:ph type="sldNum" sz="quarter" idx="10"/>
+          </p:nvPr>
+        </p:nvSpPr>
+        <p:spPr/>
+        <p:txBody>
+          <a:bodyPr/>
+          <a:lstStyle/>
+          <a:p>
+            <a:fld id="{18BDFEC3-8487-43E8-A154-7C12CBC1FFF2}" type="slidenum">
+              <a:rPr lang="en-US"/>
+              <a:t>5</a:t>
             </a:fld>
             <a:endParaRPr lang="en-US"/>
           </a:p>
@@ -4418,7 +5423,7 @@
             </a:r>
             <a:r>
               <a:rPr/>
-              <a:t>graphss</a:t>
+              <a:t>graphs</a:t>
             </a:r>
           </a:p>
         </p:txBody>
@@ -4492,251 +5497,6 @@
             <a:r>
               <a:rPr/>
               <a:t>2019-08-19</a:t>
-            </a:r>
-          </a:p>
-        </p:txBody>
-      </p:sp>
-    </p:spTree>
-  </p:cSld>
-</p:sld>
-</file>
-
-<file path=ppt/slides/slide10.xml><?xml version="1.0" encoding="utf-8"?>
-<p:sld xmlns:a="http://schemas.openxmlformats.org/drawingml/2006/main" xmlns:r="http://schemas.openxmlformats.org/officeDocument/2006/relationships" xmlns:p="http://schemas.openxmlformats.org/presentationml/2006/main">
-  <p:cSld>
-    <p:spTree>
-      <p:nvGrpSpPr>
-        <p:cNvPr id="1" name=""/>
-        <p:cNvGrpSpPr/>
-        <p:nvPr/>
-      </p:nvGrpSpPr>
-      <p:grpSpPr>
-        <a:xfrm>
-          <a:off x="0" y="0"/>
-          <a:ext cx="0" cy="0"/>
-          <a:chOff x="0" y="0"/>
-          <a:chExt cx="0" cy="0"/>
-        </a:xfrm>
-      </p:grpSpPr>
-      <p:sp>
-        <p:nvSpPr>
-          <p:cNvPr id="2" name="Title 1"/>
-          <p:cNvSpPr>
-            <a:spLocks noGrp="1"/>
-          </p:cNvSpPr>
-          <p:nvPr>
-            <p:ph type="title"/>
-          </p:nvPr>
-        </p:nvSpPr>
-        <p:spPr/>
-        <p:txBody>
-          <a:bodyPr/>
-          <a:lstStyle/>
-          <a:p>
-            <a:pPr lvl="0" marL="0" indent="0">
-              <a:buNone/>
-            </a:pPr>
-            <a:r>
-              <a:rPr/>
-              <a:t>Recommendations,</a:t>
-            </a:r>
-            <a:r>
-              <a:rPr/>
-              <a:t> </a:t>
-            </a:r>
-            <a:r>
-              <a:rPr/>
-              <a:t>aspect</a:t>
-            </a:r>
-            <a:r>
-              <a:rPr/>
-              <a:t> </a:t>
-            </a:r>
-            <a:r>
-              <a:rPr/>
-              <a:t>ratio</a:t>
-            </a:r>
-          </a:p>
-        </p:txBody>
-      </p:sp>
-    </p:spTree>
-  </p:cSld>
-</p:sld>
-</file>
-
-<file path=ppt/slides/slide11.xml><?xml version="1.0" encoding="utf-8"?>
-<p:sld xmlns:a="http://schemas.openxmlformats.org/drawingml/2006/main" xmlns:r="http://schemas.openxmlformats.org/officeDocument/2006/relationships" xmlns:p="http://schemas.openxmlformats.org/presentationml/2006/main">
-  <p:cSld>
-    <p:spTree>
-      <p:nvGrpSpPr>
-        <p:cNvPr id="1" name=""/>
-        <p:cNvGrpSpPr/>
-        <p:nvPr/>
-      </p:nvGrpSpPr>
-      <p:grpSpPr>
-        <a:xfrm>
-          <a:off x="0" y="0"/>
-          <a:ext cx="0" cy="0"/>
-          <a:chOff x="0" y="0"/>
-          <a:chExt cx="0" cy="0"/>
-        </a:xfrm>
-      </p:grpSpPr>
-      <p:sp>
-        <p:nvSpPr>
-          <p:cNvPr id="2" name="Title 1"/>
-          <p:cNvSpPr>
-            <a:spLocks noGrp="1"/>
-          </p:cNvSpPr>
-          <p:nvPr>
-            <p:ph type="title"/>
-          </p:nvPr>
-        </p:nvSpPr>
-        <p:spPr/>
-        <p:txBody>
-          <a:bodyPr/>
-          <a:lstStyle/>
-          <a:p>
-            <a:pPr lvl="0" marL="0" indent="0">
-              <a:buNone/>
-            </a:pPr>
-            <a:r>
-              <a:rPr/>
-              <a:t>Recommendations,</a:t>
-            </a:r>
-            <a:r>
-              <a:rPr/>
-              <a:t> </a:t>
-            </a:r>
-            <a:r>
-              <a:rPr/>
-              <a:t>square</a:t>
-            </a:r>
-            <a:r>
-              <a:rPr/>
-              <a:t> </a:t>
-            </a:r>
-            <a:r>
-              <a:rPr/>
-              <a:t>graphs</a:t>
-            </a:r>
-          </a:p>
-        </p:txBody>
-      </p:sp>
-    </p:spTree>
-  </p:cSld>
-</p:sld>
-</file>
-
-<file path=ppt/slides/slide12.xml><?xml version="1.0" encoding="utf-8"?>
-<p:sld xmlns:a="http://schemas.openxmlformats.org/drawingml/2006/main" xmlns:r="http://schemas.openxmlformats.org/officeDocument/2006/relationships" xmlns:p="http://schemas.openxmlformats.org/presentationml/2006/main">
-  <p:cSld>
-    <p:spTree>
-      <p:nvGrpSpPr>
-        <p:cNvPr id="1" name=""/>
-        <p:cNvGrpSpPr/>
-        <p:nvPr/>
-      </p:nvGrpSpPr>
-      <p:grpSpPr>
-        <a:xfrm>
-          <a:off x="0" y="0"/>
-          <a:ext cx="0" cy="0"/>
-          <a:chOff x="0" y="0"/>
-          <a:chExt cx="0" cy="0"/>
-        </a:xfrm>
-      </p:grpSpPr>
-      <p:sp>
-        <p:nvSpPr>
-          <p:cNvPr id="2" name="Title 1"/>
-          <p:cNvSpPr>
-            <a:spLocks noGrp="1"/>
-          </p:cNvSpPr>
-          <p:nvPr>
-            <p:ph type="title"/>
-          </p:nvPr>
-        </p:nvSpPr>
-        <p:spPr/>
-        <p:txBody>
-          <a:bodyPr/>
-          <a:lstStyle/>
-          <a:p>
-            <a:pPr lvl="0" marL="0" indent="0">
-              <a:buNone/>
-            </a:pPr>
-            <a:r>
-              <a:rPr/>
-              <a:t>Recommendations,</a:t>
-            </a:r>
-            <a:r>
-              <a:rPr/>
-              <a:t> </a:t>
-            </a:r>
-            <a:r>
-              <a:rPr/>
-              <a:t>sort</a:t>
-            </a:r>
-            <a:r>
-              <a:rPr/>
-              <a:t> </a:t>
-            </a:r>
-            <a:r>
-              <a:rPr/>
-              <a:t>your</a:t>
-            </a:r>
-            <a:r>
-              <a:rPr/>
-              <a:t> </a:t>
-            </a:r>
-            <a:r>
-              <a:rPr/>
-              <a:t>data</a:t>
-            </a:r>
-            <a:r>
-              <a:rPr/>
-              <a:t> </a:t>
-            </a:r>
-            <a:r>
-              <a:rPr/>
-              <a:t>or</a:t>
-            </a:r>
-            <a:r>
-              <a:rPr/>
-              <a:t> </a:t>
-            </a:r>
-            <a:r>
-              <a:rPr/>
-              <a:t>hope</a:t>
-            </a:r>
-            <a:r>
-              <a:rPr/>
-              <a:t> </a:t>
-            </a:r>
-            <a:r>
-              <a:rPr/>
-              <a:t>that</a:t>
-            </a:r>
-            <a:r>
-              <a:rPr/>
-              <a:t> </a:t>
-            </a:r>
-            <a:r>
-              <a:rPr/>
-              <a:t>your</a:t>
-            </a:r>
-            <a:r>
-              <a:rPr/>
-              <a:t> </a:t>
-            </a:r>
-            <a:r>
-              <a:rPr/>
-              <a:t>software</a:t>
-            </a:r>
-            <a:r>
-              <a:rPr/>
-              <a:t> </a:t>
-            </a:r>
-            <a:r>
-              <a:rPr/>
-              <a:t>does</a:t>
             </a:r>
           </a:p>
         </p:txBody>
@@ -4783,99 +5543,6 @@
             </a:pPr>
             <a:r>
               <a:rPr/>
-              <a:t>Recomendations,</a:t>
-            </a:r>
-            <a:r>
-              <a:rPr/>
-              <a:t> </a:t>
-            </a:r>
-            <a:r>
-              <a:rPr/>
-              <a:t>line</a:t>
-            </a:r>
-            <a:r>
-              <a:rPr/>
-              <a:t> </a:t>
-            </a:r>
-            <a:r>
-              <a:rPr/>
-              <a:t>graphs</a:t>
-            </a:r>
-          </a:p>
-        </p:txBody>
-      </p:sp>
-      <p:sp>
-        <p:nvSpPr>
-          <p:cNvPr id="3" name="Content Placeholder 2"/>
-          <p:cNvSpPr>
-            <a:spLocks noGrp="1"/>
-          </p:cNvSpPr>
-          <p:nvPr>
-            <p:ph idx="1"/>
-          </p:nvPr>
-        </p:nvSpPr>
-        <p:spPr/>
-        <p:txBody>
-          <a:bodyPr/>
-          <a:lstStyle/>
-          <a:p>
-            <a:pPr lvl="1"/>
-            <a:r>
-              <a:rPr/>
-              <a:t>High frequenct events</a:t>
-            </a:r>
-          </a:p>
-          <a:p>
-            <a:pPr lvl="2"/>
-            <a:r>
-              <a:rPr/>
-              <a:t>Avoid think lines, long dashes.</a:t>
-            </a:r>
-          </a:p>
-        </p:txBody>
-      </p:sp>
-    </p:spTree>
-  </p:cSld>
-</p:sld>
-</file>
-
-<file path=ppt/slides/slide3.xml><?xml version="1.0" encoding="utf-8"?>
-<p:sld xmlns:a="http://schemas.openxmlformats.org/drawingml/2006/main" xmlns:r="http://schemas.openxmlformats.org/officeDocument/2006/relationships" xmlns:p="http://schemas.openxmlformats.org/presentationml/2006/main">
-  <p:cSld>
-    <p:spTree>
-      <p:nvGrpSpPr>
-        <p:cNvPr id="1" name=""/>
-        <p:cNvGrpSpPr/>
-        <p:nvPr/>
-      </p:nvGrpSpPr>
-      <p:grpSpPr>
-        <a:xfrm>
-          <a:off x="0" y="0"/>
-          <a:ext cx="0" cy="0"/>
-          <a:chOff x="0" y="0"/>
-          <a:chExt cx="0" cy="0"/>
-        </a:xfrm>
-      </p:grpSpPr>
-      <p:sp>
-        <p:nvSpPr>
-          <p:cNvPr id="2" name="Title 1"/>
-          <p:cNvSpPr>
-            <a:spLocks noGrp="1"/>
-          </p:cNvSpPr>
-          <p:nvPr>
-            <p:ph type="title"/>
-          </p:nvPr>
-        </p:nvSpPr>
-        <p:spPr/>
-        <p:txBody>
-          <a:bodyPr/>
-          <a:lstStyle/>
-          <a:p>
-            <a:pPr lvl="0" marL="0" indent="0">
-              <a:buNone/>
-            </a:pPr>
-            <a:r>
-              <a:rPr/>
               <a:t>Recommendation,</a:t>
             </a:r>
             <a:r>
@@ -4885,14 +5552,6 @@
             <a:r>
               <a:rPr/>
               <a:t>Avoid</a:t>
-            </a:r>
-            <a:r>
-              <a:rPr/>
-              <a:t> </a:t>
-            </a:r>
-            <a:r>
-              <a:rPr/>
-              <a:t>thick</a:t>
             </a:r>
             <a:r>
               <a:rPr/>
@@ -4980,6 +5639,225 @@
 </p:sld>
 </file>
 
+<file path=ppt/slides/slide3.xml><?xml version="1.0" encoding="utf-8"?>
+<p:sld xmlns:a="http://schemas.openxmlformats.org/drawingml/2006/main" xmlns:r="http://schemas.openxmlformats.org/officeDocument/2006/relationships" xmlns:p="http://schemas.openxmlformats.org/presentationml/2006/main">
+  <p:cSld>
+    <p:spTree>
+      <p:nvGrpSpPr>
+        <p:cNvPr id="1" name=""/>
+        <p:cNvGrpSpPr/>
+        <p:nvPr/>
+      </p:nvGrpSpPr>
+      <p:grpSpPr>
+        <a:xfrm>
+          <a:off x="0" y="0"/>
+          <a:ext cx="0" cy="0"/>
+          <a:chOff x="0" y="0"/>
+          <a:chExt cx="0" cy="0"/>
+        </a:xfrm>
+      </p:grpSpPr>
+      <p:sp>
+        <p:nvSpPr>
+          <p:cNvPr id="2" name="Title 1"/>
+          <p:cNvSpPr>
+            <a:spLocks noGrp="1"/>
+          </p:cNvSpPr>
+          <p:nvPr>
+            <p:ph type="title"/>
+          </p:nvPr>
+        </p:nvSpPr>
+        <p:spPr/>
+        <p:txBody>
+          <a:bodyPr/>
+          <a:lstStyle/>
+          <a:p>
+            <a:pPr lvl="0" marL="0" indent="0">
+              <a:buNone/>
+            </a:pPr>
+            <a:r>
+              <a:rPr/>
+              <a:t>Recommendations,</a:t>
+            </a:r>
+            <a:r>
+              <a:rPr/>
+              <a:t> </a:t>
+            </a:r>
+            <a:r>
+              <a:rPr/>
+              <a:t>Avoid</a:t>
+            </a:r>
+            <a:r>
+              <a:rPr/>
+              <a:t> </a:t>
+            </a:r>
+            <a:r>
+              <a:rPr/>
+              <a:t>error</a:t>
+            </a:r>
+            <a:r>
+              <a:rPr/>
+              <a:t> </a:t>
+            </a:r>
+            <a:r>
+              <a:rPr/>
+              <a:t>bars</a:t>
+            </a:r>
+            <a:r>
+              <a:rPr/>
+              <a:t> </a:t>
+            </a:r>
+            <a:r>
+              <a:rPr/>
+              <a:t>(1/3)</a:t>
+            </a:r>
+          </a:p>
+        </p:txBody>
+      </p:sp>
+      <p:pic>
+        <p:nvPicPr>
+          <p:cNvPr descr="../images/r/average-with-standard-deviation.png" id="0" name="Picture 1"/>
+          <p:cNvPicPr>
+            <a:picLocks noGrp="1" noChangeAspect="1"/>
+          </p:cNvPicPr>
+          <p:nvPr/>
+        </p:nvPicPr>
+        <p:blipFill>
+          <a:blip r:embed="rId3"/>
+          <a:stretch>
+            <a:fillRect/>
+          </a:stretch>
+        </p:blipFill>
+        <p:spPr bwMode="auto">
+          <a:xfrm>
+            <a:off x="2565400" y="1600200"/>
+            <a:ext cx="4013200" cy="4013200"/>
+          </a:xfrm>
+          <a:prstGeom prst="rect">
+            <a:avLst/>
+          </a:prstGeom>
+          <a:noFill/>
+          <a:ln w="9525">
+            <a:noFill/>
+            <a:headEnd/>
+            <a:tailEnd/>
+          </a:ln>
+        </p:spPr>
+      </p:pic>
+      <p:sp>
+        <p:nvSpPr>
+          <p:cNvPr id="1" name="TextBox 3"/>
+          <p:cNvSpPr txBox="1"/>
+          <p:nvPr/>
+        </p:nvSpPr>
+        <p:spPr>
+          <a:xfrm>
+            <a:off x="457200" y="5613400"/>
+            <a:ext cx="8229600" cy="508000"/>
+          </a:xfrm>
+          <a:prstGeom prst="rect">
+            <a:avLst/>
+          </a:prstGeom>
+          <a:noFill/>
+        </p:spPr>
+        <p:txBody>
+          <a:bodyPr/>
+          <a:lstStyle/>
+          <a:p>
+            <a:pPr lvl="0" marL="0" indent="0" algn="ctr">
+              <a:buNone/>
+            </a:pPr>
+            <a:r>
+              <a:rPr/>
+              <a:t>Average</a:t>
+            </a:r>
+            <a:r>
+              <a:rPr/>
+              <a:t> </a:t>
+            </a:r>
+            <a:r>
+              <a:rPr/>
+              <a:t>price</a:t>
+            </a:r>
+            <a:r>
+              <a:rPr/>
+              <a:t> </a:t>
+            </a:r>
+            <a:r>
+              <a:rPr/>
+              <a:t>shown</a:t>
+            </a:r>
+            <a:r>
+              <a:rPr/>
+              <a:t> </a:t>
+            </a:r>
+            <a:r>
+              <a:rPr/>
+              <a:t>with</a:t>
+            </a:r>
+            <a:r>
+              <a:rPr/>
+              <a:t> </a:t>
+            </a:r>
+            <a:r>
+              <a:rPr/>
+              <a:t>error</a:t>
+            </a:r>
+            <a:r>
+              <a:rPr/>
+              <a:t> </a:t>
+            </a:r>
+            <a:r>
+              <a:rPr/>
+              <a:t>bar</a:t>
+            </a:r>
+            <a:r>
+              <a:rPr/>
+              <a:t> </a:t>
+            </a:r>
+            <a:r>
+              <a:rPr/>
+              <a:t>equal</a:t>
+            </a:r>
+            <a:r>
+              <a:rPr/>
+              <a:t> </a:t>
+            </a:r>
+            <a:r>
+              <a:rPr/>
+              <a:t>to</a:t>
+            </a:r>
+            <a:r>
+              <a:rPr/>
+              <a:t> </a:t>
+            </a:r>
+            <a:r>
+              <a:rPr/>
+              <a:t>one</a:t>
+            </a:r>
+            <a:r>
+              <a:rPr/>
+              <a:t> </a:t>
+            </a:r>
+            <a:r>
+              <a:rPr/>
+              <a:t>standard</a:t>
+            </a:r>
+            <a:r>
+              <a:rPr/>
+              <a:t> </a:t>
+            </a:r>
+            <a:r>
+              <a:rPr/>
+              <a:t>deviaiton</a:t>
+            </a:r>
+          </a:p>
+        </p:txBody>
+      </p:sp>
+    </p:spTree>
+  </p:cSld>
+</p:sld>
+</file>
+
 <file path=ppt/slides/slide4.xml><?xml version="1.0" encoding="utf-8"?>
 <p:sld xmlns:a="http://schemas.openxmlformats.org/drawingml/2006/main" xmlns:r="http://schemas.openxmlformats.org/officeDocument/2006/relationships" xmlns:p="http://schemas.openxmlformats.org/presentationml/2006/main">
   <p:cSld>
@@ -5025,59 +5903,171 @@
             </a:r>
             <a:r>
               <a:rPr/>
-              <a:t>show</a:t>
-            </a:r>
-            <a:r>
-              <a:rPr/>
-              <a:t> </a:t>
-            </a:r>
-            <a:r>
-              <a:rPr/>
-              <a:t>variation</a:t>
-            </a:r>
-          </a:p>
-        </p:txBody>
-      </p:sp>
-      <p:sp>
-        <p:nvSpPr>
-          <p:cNvPr id="3" name="Content Placeholder 2"/>
-          <p:cNvSpPr>
-            <a:spLocks noGrp="1"/>
-          </p:cNvSpPr>
-          <p:nvPr>
-            <p:ph idx="1"/>
-          </p:nvPr>
-        </p:nvSpPr>
-        <p:spPr/>
+              <a:t>Avoid</a:t>
+            </a:r>
+            <a:r>
+              <a:rPr/>
+              <a:t> </a:t>
+            </a:r>
+            <a:r>
+              <a:rPr/>
+              <a:t>error</a:t>
+            </a:r>
+            <a:r>
+              <a:rPr/>
+              <a:t> </a:t>
+            </a:r>
+            <a:r>
+              <a:rPr/>
+              <a:t>bars</a:t>
+            </a:r>
+            <a:r>
+              <a:rPr/>
+              <a:t> </a:t>
+            </a:r>
+            <a:r>
+              <a:rPr/>
+              <a:t>(2/3)</a:t>
+            </a:r>
+          </a:p>
+        </p:txBody>
+      </p:sp>
+      <p:pic>
+        <p:nvPicPr>
+          <p:cNvPr descr="../images/r/average-with-standard-error.png" id="0" name="Picture 1"/>
+          <p:cNvPicPr>
+            <a:picLocks noGrp="1" noChangeAspect="1"/>
+          </p:cNvPicPr>
+          <p:nvPr/>
+        </p:nvPicPr>
+        <p:blipFill>
+          <a:blip r:embed="rId3"/>
+          <a:stretch>
+            <a:fillRect/>
+          </a:stretch>
+        </p:blipFill>
+        <p:spPr bwMode="auto">
+          <a:xfrm>
+            <a:off x="2565400" y="1600200"/>
+            <a:ext cx="4013200" cy="4013200"/>
+          </a:xfrm>
+          <a:prstGeom prst="rect">
+            <a:avLst/>
+          </a:prstGeom>
+          <a:noFill/>
+          <a:ln w="9525">
+            <a:noFill/>
+            <a:headEnd/>
+            <a:tailEnd/>
+          </a:ln>
+        </p:spPr>
+      </p:pic>
+      <p:sp>
+        <p:nvSpPr>
+          <p:cNvPr id="1" name="TextBox 3"/>
+          <p:cNvSpPr txBox="1"/>
+          <p:nvPr/>
+        </p:nvSpPr>
+        <p:spPr>
+          <a:xfrm>
+            <a:off x="457200" y="5613400"/>
+            <a:ext cx="8229600" cy="508000"/>
+          </a:xfrm>
+          <a:prstGeom prst="rect">
+            <a:avLst/>
+          </a:prstGeom>
+          <a:noFill/>
+        </p:spPr>
         <p:txBody>
           <a:bodyPr/>
           <a:lstStyle/>
           <a:p>
-            <a:pPr lvl="1"/>
-            <a:r>
-              <a:rPr/>
-              <a:t>Original data</a:t>
-            </a:r>
-          </a:p>
-          <a:p>
-            <a:pPr lvl="1"/>
-            <a:r>
-              <a:rPr/>
-              <a:t>Error bars</a:t>
-            </a:r>
-          </a:p>
-          <a:p>
-            <a:pPr lvl="1"/>
-            <a:r>
-              <a:rPr/>
-              <a:t>Confidence bands</a:t>
-            </a:r>
-          </a:p>
-          <a:p>
-            <a:pPr lvl="1"/>
-            <a:r>
-              <a:rPr/>
-              <a:t>Boxplots</a:t>
+            <a:pPr lvl="0" marL="0" indent="0" algn="ctr">
+              <a:buNone/>
+            </a:pPr>
+            <a:r>
+              <a:rPr/>
+              <a:t>Average</a:t>
+            </a:r>
+            <a:r>
+              <a:rPr/>
+              <a:t> </a:t>
+            </a:r>
+            <a:r>
+              <a:rPr/>
+              <a:t>price</a:t>
+            </a:r>
+            <a:r>
+              <a:rPr/>
+              <a:t> </a:t>
+            </a:r>
+            <a:r>
+              <a:rPr/>
+              <a:t>shown</a:t>
+            </a:r>
+            <a:r>
+              <a:rPr/>
+              <a:t> </a:t>
+            </a:r>
+            <a:r>
+              <a:rPr/>
+              <a:t>with</a:t>
+            </a:r>
+            <a:r>
+              <a:rPr/>
+              <a:t> </a:t>
+            </a:r>
+            <a:r>
+              <a:rPr/>
+              <a:t>error</a:t>
+            </a:r>
+            <a:r>
+              <a:rPr/>
+              <a:t> </a:t>
+            </a:r>
+            <a:r>
+              <a:rPr/>
+              <a:t>bar</a:t>
+            </a:r>
+            <a:r>
+              <a:rPr/>
+              <a:t> </a:t>
+            </a:r>
+            <a:r>
+              <a:rPr/>
+              <a:t>equal</a:t>
+            </a:r>
+            <a:r>
+              <a:rPr/>
+              <a:t> </a:t>
+            </a:r>
+            <a:r>
+              <a:rPr/>
+              <a:t>to</a:t>
+            </a:r>
+            <a:r>
+              <a:rPr/>
+              <a:t> </a:t>
+            </a:r>
+            <a:r>
+              <a:rPr/>
+              <a:t>one</a:t>
+            </a:r>
+            <a:r>
+              <a:rPr/>
+              <a:t> </a:t>
+            </a:r>
+            <a:r>
+              <a:rPr/>
+              <a:t>standard</a:t>
+            </a:r>
+            <a:r>
+              <a:rPr/>
+              <a:t> </a:t>
+            </a:r>
+            <a:r>
+              <a:rPr/>
+              <a:t>error</a:t>
             </a:r>
           </a:p>
         </p:txBody>
@@ -5124,49 +6114,108 @@
             </a:pPr>
             <a:r>
               <a:rPr/>
-              <a:t>R</a:t>
-            </a:r>
-            <a:r>
-              <a:rPr/>
-              <a:t> </a:t>
-            </a:r>
-            <a:r>
-              <a:rPr/>
-              <a:t>output</a:t>
-            </a:r>
-          </a:p>
-        </p:txBody>
-      </p:sp>
-      <p:pic>
-        <p:nvPicPr>
-          <p:cNvPr descr="../images/r/average-with-standard-deviation.png" id="0" name="Picture 1"/>
-          <p:cNvPicPr>
-            <a:picLocks noGrp="1" noChangeAspect="1"/>
-          </p:cNvPicPr>
-          <p:nvPr/>
-        </p:nvPicPr>
-        <p:blipFill>
-          <a:blip r:embed="rId3"/>
-          <a:stretch>
-            <a:fillRect/>
-          </a:stretch>
-        </p:blipFill>
-        <p:spPr bwMode="auto">
-          <a:xfrm>
-            <a:off x="2311400" y="1600200"/>
-            <a:ext cx="4521200" cy="4521200"/>
-          </a:xfrm>
-          <a:prstGeom prst="rect">
-            <a:avLst/>
-          </a:prstGeom>
-          <a:noFill/>
-          <a:ln w="9525">
-            <a:noFill/>
-            <a:headEnd/>
-            <a:tailEnd/>
-          </a:ln>
-        </p:spPr>
-      </p:pic>
+              <a:t>Recommendations,</a:t>
+            </a:r>
+            <a:r>
+              <a:rPr/>
+              <a:t> </a:t>
+            </a:r>
+            <a:r>
+              <a:rPr/>
+              <a:t>Avoid</a:t>
+            </a:r>
+            <a:r>
+              <a:rPr/>
+              <a:t> </a:t>
+            </a:r>
+            <a:r>
+              <a:rPr/>
+              <a:t>error</a:t>
+            </a:r>
+            <a:r>
+              <a:rPr/>
+              <a:t> </a:t>
+            </a:r>
+            <a:r>
+              <a:rPr/>
+              <a:t>bars</a:t>
+            </a:r>
+            <a:r>
+              <a:rPr/>
+              <a:t> </a:t>
+            </a:r>
+            <a:r>
+              <a:rPr/>
+              <a:t>(3/3)</a:t>
+            </a:r>
+          </a:p>
+        </p:txBody>
+      </p:sp>
+      <p:sp>
+        <p:nvSpPr>
+          <p:cNvPr id="3" name="Content Placeholder 2"/>
+          <p:cNvSpPr>
+            <a:spLocks noGrp="1"/>
+          </p:cNvSpPr>
+          <p:nvPr>
+            <p:ph idx="1"/>
+          </p:nvPr>
+        </p:nvSpPr>
+        <p:spPr/>
+        <p:txBody>
+          <a:bodyPr/>
+          <a:lstStyle/>
+          <a:p>
+            <a:pPr lvl="1"/>
+            <a:r>
+              <a:rPr/>
+              <a:t>No agreed upon definition for error bars</a:t>
+            </a:r>
+          </a:p>
+          <a:p>
+            <a:pPr lvl="2"/>
+            <a:r>
+              <a:rPr/>
+              <a:t>One standard deviation?</a:t>
+            </a:r>
+          </a:p>
+          <a:p>
+            <a:pPr lvl="2"/>
+            <a:r>
+              <a:rPr/>
+              <a:t>One standard error?</a:t>
+            </a:r>
+          </a:p>
+          <a:p>
+            <a:pPr lvl="2"/>
+            <a:r>
+              <a:rPr/>
+              <a:t>Confidence interval?</a:t>
+            </a:r>
+          </a:p>
+          <a:p>
+            <a:pPr lvl="2"/>
+            <a:r>
+              <a:rPr/>
+              <a:t>Range?</a:t>
+            </a:r>
+          </a:p>
+          <a:p>
+            <a:pPr lvl="1"/>
+            <a:r>
+              <a:rPr/>
+              <a:t>Error bars may hide asymmetric distributions</a:t>
+            </a:r>
+          </a:p>
+          <a:p>
+            <a:pPr lvl="1"/>
+            <a:r>
+              <a:rPr/>
+              <a:t>What does an overlap, non-overlap mean?</a:t>
+            </a:r>
+          </a:p>
+        </p:txBody>
+      </p:sp>
     </p:spTree>
   </p:cSld>
 </p:sld>
@@ -5209,49 +6258,95 @@
             </a:pPr>
             <a:r>
               <a:rPr/>
-              <a:t>R</a:t>
-            </a:r>
-            <a:r>
-              <a:rPr/>
-              <a:t> </a:t>
-            </a:r>
-            <a:r>
-              <a:rPr/>
-              <a:t>output</a:t>
-            </a:r>
-          </a:p>
-        </p:txBody>
-      </p:sp>
-      <p:pic>
-        <p:nvPicPr>
-          <p:cNvPr descr="../images/r/average-with-standard-error.png" id="0" name="Picture 1"/>
-          <p:cNvPicPr>
-            <a:picLocks noGrp="1" noChangeAspect="1"/>
-          </p:cNvPicPr>
-          <p:nvPr/>
-        </p:nvPicPr>
-        <p:blipFill>
-          <a:blip r:embed="rId3"/>
-          <a:stretch>
-            <a:fillRect/>
-          </a:stretch>
-        </p:blipFill>
-        <p:spPr bwMode="auto">
-          <a:xfrm>
-            <a:off x="2311400" y="1600200"/>
-            <a:ext cx="4521200" cy="4521200"/>
-          </a:xfrm>
-          <a:prstGeom prst="rect">
-            <a:avLst/>
-          </a:prstGeom>
-          <a:noFill/>
-          <a:ln w="9525">
-            <a:noFill/>
-            <a:headEnd/>
-            <a:tailEnd/>
-          </a:ln>
-        </p:spPr>
-      </p:pic>
+              <a:t>Recommendations,</a:t>
+            </a:r>
+            <a:r>
+              <a:rPr/>
+              <a:t> </a:t>
+            </a:r>
+            <a:r>
+              <a:rPr/>
+              <a:t>Alternatives</a:t>
+            </a:r>
+            <a:r>
+              <a:rPr/>
+              <a:t> </a:t>
+            </a:r>
+            <a:r>
+              <a:rPr/>
+              <a:t>to</a:t>
+            </a:r>
+            <a:r>
+              <a:rPr/>
+              <a:t> </a:t>
+            </a:r>
+            <a:r>
+              <a:rPr/>
+              <a:t>error</a:t>
+            </a:r>
+            <a:r>
+              <a:rPr/>
+              <a:t> </a:t>
+            </a:r>
+            <a:r>
+              <a:rPr/>
+              <a:t>bars</a:t>
+            </a:r>
+            <a:r>
+              <a:rPr/>
+              <a:t> </a:t>
+            </a:r>
+            <a:r>
+              <a:rPr/>
+              <a:t>(1/2)</a:t>
+            </a:r>
+          </a:p>
+        </p:txBody>
+      </p:sp>
+      <p:sp>
+        <p:nvSpPr>
+          <p:cNvPr id="3" name="Content Placeholder 2"/>
+          <p:cNvSpPr>
+            <a:spLocks noGrp="1"/>
+          </p:cNvSpPr>
+          <p:nvPr>
+            <p:ph idx="1"/>
+          </p:nvPr>
+        </p:nvSpPr>
+        <p:spPr/>
+        <p:txBody>
+          <a:bodyPr/>
+          <a:lstStyle/>
+          <a:p>
+            <a:pPr lvl="1"/>
+            <a:r>
+              <a:rPr/>
+              <a:t>Original data</a:t>
+            </a:r>
+          </a:p>
+          <a:p>
+            <a:pPr lvl="1"/>
+            <a:r>
+              <a:rPr/>
+              <a:t>Error bars</a:t>
+            </a:r>
+          </a:p>
+          <a:p>
+            <a:pPr lvl="1"/>
+            <a:r>
+              <a:rPr/>
+              <a:t>Confidence bands</a:t>
+            </a:r>
+          </a:p>
+          <a:p>
+            <a:pPr lvl="1"/>
+            <a:r>
+              <a:rPr/>
+              <a:t>Boxplots</a:t>
+            </a:r>
+          </a:p>
+        </p:txBody>
+      </p:sp>
     </p:spTree>
   </p:cSld>
 </p:sld>
@@ -5294,81 +6389,27 @@
             </a:pPr>
             <a:r>
               <a:rPr/>
-              <a:t>Recommendations,</a:t>
-            </a:r>
-            <a:r>
-              <a:rPr/>
-              <a:t> </a:t>
-            </a:r>
-            <a:r>
-              <a:rPr/>
-              <a:t>when</a:t>
-            </a:r>
-            <a:r>
-              <a:rPr/>
-              <a:t> </a:t>
-            </a:r>
-            <a:r>
-              <a:rPr/>
-              <a:t>to</a:t>
-            </a:r>
-            <a:r>
-              <a:rPr/>
-              <a:t> </a:t>
-            </a:r>
-            <a:r>
-              <a:rPr/>
-              <a:t>start</a:t>
-            </a:r>
-            <a:r>
-              <a:rPr/>
-              <a:t> </a:t>
-            </a:r>
-            <a:r>
-              <a:rPr/>
-              <a:t>at</a:t>
-            </a:r>
-            <a:r>
-              <a:rPr/>
-              <a:t> </a:t>
-            </a:r>
-            <a:r>
-              <a:rPr/>
-              <a:t>zero</a:t>
-            </a:r>
-          </a:p>
-        </p:txBody>
-      </p:sp>
-    </p:spTree>
-  </p:cSld>
-</p:sld>
-</file>
-
-<file path=ppt/slides/slide8.xml><?xml version="1.0" encoding="utf-8"?>
-<p:sld xmlns:a="http://schemas.openxmlformats.org/drawingml/2006/main" xmlns:r="http://schemas.openxmlformats.org/officeDocument/2006/relationships" xmlns:p="http://schemas.openxmlformats.org/presentationml/2006/main">
-  <p:cSld>
-    <p:spTree>
-      <p:nvGrpSpPr>
-        <p:cNvPr id="1" name=""/>
-        <p:cNvGrpSpPr/>
-        <p:nvPr/>
-      </p:nvGrpSpPr>
-      <p:grpSpPr>
-        <a:xfrm>
-          <a:off x="0" y="0"/>
-          <a:ext cx="0" cy="0"/>
-          <a:chOff x="0" y="0"/>
-          <a:chExt cx="0" cy="0"/>
-        </a:xfrm>
-      </p:grpSpPr>
-      <p:sp>
-        <p:nvSpPr>
-          <p:cNvPr id="2" name="Title 1"/>
-          <p:cNvSpPr>
-            <a:spLocks noGrp="1"/>
-          </p:cNvSpPr>
-          <p:nvPr>
-            <p:ph type="title"/>
+              <a:t>Remaining</a:t>
+            </a:r>
+            <a:r>
+              <a:rPr/>
+              <a:t> </a:t>
+            </a:r>
+            <a:r>
+              <a:rPr/>
+              <a:t>work</a:t>
+            </a:r>
+          </a:p>
+        </p:txBody>
+      </p:sp>
+      <p:sp>
+        <p:nvSpPr>
+          <p:cNvPr id="3" name="Content Placeholder 2"/>
+          <p:cNvSpPr>
+            <a:spLocks noGrp="1"/>
+          </p:cNvSpPr>
+          <p:nvPr>
+            <p:ph idx="1"/>
           </p:nvPr>
         </p:nvSpPr>
         <p:spPr/>
@@ -5376,115 +6417,45 @@
           <a:bodyPr/>
           <a:lstStyle/>
           <a:p>
-            <a:pPr lvl="0" marL="0" indent="0">
-              <a:buNone/>
-            </a:pPr>
-            <a:r>
-              <a:rPr/>
-              <a:t>Recommendations,</a:t>
-            </a:r>
-            <a:r>
-              <a:rPr/>
-              <a:t> </a:t>
-            </a:r>
-            <a:r>
-              <a:rPr/>
-              <a:t>differentiating</a:t>
-            </a:r>
-            <a:r>
-              <a:rPr/>
-              <a:t> </a:t>
-            </a:r>
-            <a:r>
-              <a:rPr/>
-              <a:t>lines</a:t>
-            </a:r>
-          </a:p>
-        </p:txBody>
-      </p:sp>
-    </p:spTree>
-  </p:cSld>
-</p:sld>
-</file>
-
-<file path=ppt/slides/slide9.xml><?xml version="1.0" encoding="utf-8"?>
-<p:sld xmlns:a="http://schemas.openxmlformats.org/drawingml/2006/main" xmlns:r="http://schemas.openxmlformats.org/officeDocument/2006/relationships" xmlns:p="http://schemas.openxmlformats.org/presentationml/2006/main">
-  <p:cSld>
-    <p:spTree>
-      <p:nvGrpSpPr>
-        <p:cNvPr id="1" name=""/>
-        <p:cNvGrpSpPr/>
-        <p:nvPr/>
-      </p:nvGrpSpPr>
-      <p:grpSpPr>
-        <a:xfrm>
-          <a:off x="0" y="0"/>
-          <a:ext cx="0" cy="0"/>
-          <a:chOff x="0" y="0"/>
-          <a:chExt cx="0" cy="0"/>
-        </a:xfrm>
-      </p:grpSpPr>
-      <p:sp>
-        <p:nvSpPr>
-          <p:cNvPr id="2" name="Title 1"/>
-          <p:cNvSpPr>
-            <a:spLocks noGrp="1"/>
-          </p:cNvSpPr>
-          <p:nvPr>
-            <p:ph type="title"/>
-          </p:nvPr>
-        </p:nvSpPr>
-        <p:spPr/>
-        <p:txBody>
-          <a:bodyPr/>
-          <a:lstStyle/>
-          <a:p>
-            <a:pPr lvl="0" marL="0" indent="0">
-              <a:buNone/>
-            </a:pPr>
-            <a:r>
-              <a:rPr/>
-              <a:t>Recommendations,</a:t>
-            </a:r>
-            <a:r>
-              <a:rPr/>
-              <a:t> </a:t>
-            </a:r>
-            <a:r>
-              <a:rPr/>
-              <a:t>lines</a:t>
-            </a:r>
-            <a:r>
-              <a:rPr/>
-              <a:t> </a:t>
-            </a:r>
-            <a:r>
-              <a:rPr/>
-              <a:t>imply</a:t>
-            </a:r>
-            <a:r>
-              <a:rPr/>
-              <a:t> </a:t>
-            </a:r>
-            <a:r>
-              <a:rPr/>
-              <a:t>continuity,</a:t>
-            </a:r>
-            <a:r>
-              <a:rPr/>
-              <a:t> </a:t>
-            </a:r>
-            <a:r>
-              <a:rPr/>
-              <a:t>bars</a:t>
-            </a:r>
-            <a:r>
-              <a:rPr/>
-              <a:t> </a:t>
-            </a:r>
-            <a:r>
-              <a:rPr/>
-              <a:t>don’t</a:t>
+            <a:pPr lvl="1"/>
+            <a:r>
+              <a:rPr/>
+              <a:t>Recommendations, when to start at zero</a:t>
+            </a:r>
+          </a:p>
+          <a:p>
+            <a:pPr lvl="1"/>
+            <a:r>
+              <a:rPr/>
+              <a:t>Recommendations, differentiating lines</a:t>
+            </a:r>
+          </a:p>
+          <a:p>
+            <a:pPr lvl="1"/>
+            <a:r>
+              <a:rPr/>
+              <a:t>Recommendations, lines imply continuity, bars don’t</a:t>
+            </a:r>
+          </a:p>
+          <a:p>
+            <a:pPr lvl="1"/>
+            <a:r>
+              <a:rPr/>
+              <a:t>Recommendations, aspect ratio</a:t>
+            </a:r>
+          </a:p>
+          <a:p>
+            <a:pPr lvl="1"/>
+            <a:r>
+              <a:rPr/>
+              <a:t>Recommendations, square graphs</a:t>
+            </a:r>
+          </a:p>
+          <a:p>
+            <a:pPr lvl="1"/>
+            <a:r>
+              <a:rPr/>
+              <a:t>Recommendations, sort your data or hope that your software does</a:t>
             </a:r>
           </a:p>
         </p:txBody>

</xml_diff>

<commit_message>
Revised quiz for data-viz-03
</commit_message>
<xml_diff>
--- a/data-viz-03/component/recommendations-linegraphs.pptx
+++ b/data-viz-03/component/recommendations-linegraphs.pptx
@@ -5,7 +5,7 @@
     <p:sldMasterId id="2147483648" r:id="rId1"/>
   </p:sldMasterIdLst>
   <p:notesMasterIdLst>
-    <p:NotesMasterId r:id="rId22"/>
+    <p:NotesMasterId r:id="rId23"/>
   </p:notesMasterIdLst>
   <p:sldIdLst>
     <p:sldId id="256" r:id="rId2"/>
@@ -28,6 +28,7 @@
     <p:sldId id="273" r:id="rId19"/>
     <p:sldId id="274" r:id="rId20"/>
     <p:sldId id="275" r:id="rId21"/>
+    <p:sldId id="276" r:id="rId22"/>
   </p:sldIdLst>
   <p:sldSz cx="9144000" cy="6858000" type="screen4x3"/>
   <p:notesSz cx="6858000" cy="9144000"/>
@@ -4231,6 +4232,546 @@
             <a:fld id="{18BDFEC3-8487-43E8-A154-7C12CBC1FFF2}" type="slidenum">
               <a:rPr lang="en-US"/>
               <a:t>16</a:t>
+            </a:fld>
+            <a:endParaRPr lang="en-US"/>
+          </a:p>
+        </p:txBody>
+      </p:sp>
+    </p:spTree>
+  </p:cSld>
+</p:notes>
+</file>
+
+<file path=ppt/notesSlides/notesSlide16.xml><?xml version="1.0" encoding="utf-8"?>
+<p:notes xmlns:a="http://schemas.openxmlformats.org/drawingml/2006/main" xmlns:r="http://schemas.openxmlformats.org/officeDocument/2006/relationships" xmlns:p="http://schemas.openxmlformats.org/presentationml/2006/main">
+  <p:cSld>
+    <p:spTree>
+      <p:nvGrpSpPr>
+        <p:cNvPr id="1" name=""/>
+        <p:cNvGrpSpPr/>
+        <p:nvPr/>
+      </p:nvGrpSpPr>
+      <p:grpSpPr>
+        <a:xfrm>
+          <a:off x="0" y="0"/>
+          <a:ext cx="0" cy="0"/>
+          <a:chOff x="0" y="0"/>
+          <a:chExt cx="0" cy="0"/>
+        </a:xfrm>
+      </p:grpSpPr>
+      <p:sp>
+        <p:nvSpPr>
+          <p:cNvPr id="2" name="Slide Image Placeholder 1"/>
+          <p:cNvSpPr>
+            <a:spLocks noGrp="1" noRot="1" noChangeAspect="1"/>
+          </p:cNvSpPr>
+          <p:nvPr>
+            <p:ph type="sldImg"/>
+          </p:nvPr>
+        </p:nvSpPr>
+        <p:spPr/>
+      </p:sp>
+      <p:sp>
+        <p:nvSpPr>
+          <p:cNvPr id="3" name="Notes Placeholder 2"/>
+          <p:cNvSpPr>
+            <a:spLocks noGrp="1"/>
+          </p:cNvSpPr>
+          <p:nvPr>
+            <p:ph type="body" idx="1"/>
+          </p:nvPr>
+        </p:nvSpPr>
+        <p:spPr/>
+        <p:txBody>
+          <a:bodyPr/>
+          <a:lstStyle/>
+          <a:p>
+            <a:pPr lvl="0" marL="0" indent="0">
+              <a:buNone/>
+            </a:pPr>
+            <a:r>
+              <a:rPr/>
+              <a:t>This</a:t>
+            </a:r>
+            <a:r>
+              <a:rPr/>
+              <a:t> </a:t>
+            </a:r>
+            <a:r>
+              <a:rPr/>
+              <a:t>is</a:t>
+            </a:r>
+            <a:r>
+              <a:rPr/>
+              <a:t> </a:t>
+            </a:r>
+            <a:r>
+              <a:rPr/>
+              <a:t>a</a:t>
+            </a:r>
+            <a:r>
+              <a:rPr/>
+              <a:t> </a:t>
+            </a:r>
+            <a:r>
+              <a:rPr/>
+              <a:t>graph</a:t>
+            </a:r>
+            <a:r>
+              <a:rPr/>
+              <a:t> </a:t>
+            </a:r>
+            <a:r>
+              <a:rPr/>
+              <a:t>which</a:t>
+            </a:r>
+            <a:r>
+              <a:rPr/>
+              <a:t> </a:t>
+            </a:r>
+            <a:r>
+              <a:rPr/>
+              <a:t>is</a:t>
+            </a:r>
+            <a:r>
+              <a:rPr/>
+              <a:t> </a:t>
+            </a:r>
+            <a:r>
+              <a:rPr/>
+              <a:t>(roughly)</a:t>
+            </a:r>
+            <a:r>
+              <a:rPr/>
+              <a:t> </a:t>
+            </a:r>
+            <a:r>
+              <a:rPr/>
+              <a:t>twice</a:t>
+            </a:r>
+            <a:r>
+              <a:rPr/>
+              <a:t> </a:t>
+            </a:r>
+            <a:r>
+              <a:rPr/>
+              <a:t>as</a:t>
+            </a:r>
+            <a:r>
+              <a:rPr/>
+              <a:t> </a:t>
+            </a:r>
+            <a:r>
+              <a:rPr/>
+              <a:t>wide</a:t>
+            </a:r>
+            <a:r>
+              <a:rPr/>
+              <a:t> </a:t>
+            </a:r>
+            <a:r>
+              <a:rPr/>
+              <a:t>as</a:t>
+            </a:r>
+            <a:r>
+              <a:rPr/>
+              <a:t> </a:t>
+            </a:r>
+            <a:r>
+              <a:rPr/>
+              <a:t>it</a:t>
+            </a:r>
+            <a:r>
+              <a:rPr/>
+              <a:t> </a:t>
+            </a:r>
+            <a:r>
+              <a:rPr/>
+              <a:t>is</a:t>
+            </a:r>
+            <a:r>
+              <a:rPr/>
+              <a:t> </a:t>
+            </a:r>
+            <a:r>
+              <a:rPr/>
+              <a:t>tall.</a:t>
+            </a:r>
+            <a:r>
+              <a:rPr/>
+              <a:t> </a:t>
+            </a:r>
+            <a:r>
+              <a:rPr/>
+              <a:t>Sometimes</a:t>
+            </a:r>
+            <a:r>
+              <a:rPr/>
+              <a:t> </a:t>
+            </a:r>
+            <a:r>
+              <a:rPr/>
+              <a:t>this</a:t>
+            </a:r>
+            <a:r>
+              <a:rPr/>
+              <a:t> </a:t>
+            </a:r>
+            <a:r>
+              <a:rPr/>
+              <a:t>is</a:t>
+            </a:r>
+            <a:r>
+              <a:rPr/>
+              <a:t> </a:t>
+            </a:r>
+            <a:r>
+              <a:rPr/>
+              <a:t>called</a:t>
+            </a:r>
+            <a:r>
+              <a:rPr/>
+              <a:t> </a:t>
+            </a:r>
+            <a:r>
+              <a:rPr/>
+              <a:t>landscape</a:t>
+            </a:r>
+            <a:r>
+              <a:rPr/>
+              <a:t> </a:t>
+            </a:r>
+            <a:r>
+              <a:rPr/>
+              <a:t>orientation.</a:t>
+            </a:r>
+            <a:r>
+              <a:rPr/>
+              <a:t> </a:t>
+            </a:r>
+            <a:r>
+              <a:rPr/>
+              <a:t>Compare</a:t>
+            </a:r>
+            <a:r>
+              <a:rPr/>
+              <a:t> </a:t>
+            </a:r>
+            <a:r>
+              <a:rPr/>
+              <a:t>this</a:t>
+            </a:r>
+            <a:r>
+              <a:rPr/>
+              <a:t> </a:t>
+            </a:r>
+            <a:r>
+              <a:rPr/>
+              <a:t>to</a:t>
+            </a:r>
+            <a:r>
+              <a:rPr/>
+              <a:t> </a:t>
+            </a:r>
+            <a:r>
+              <a:rPr/>
+              <a:t>the</a:t>
+            </a:r>
+            <a:r>
+              <a:rPr/>
+              <a:t> </a:t>
+            </a:r>
+            <a:r>
+              <a:rPr/>
+              <a:t>next</a:t>
+            </a:r>
+            <a:r>
+              <a:rPr/>
+              <a:t> </a:t>
+            </a:r>
+            <a:r>
+              <a:rPr/>
+              <a:t>graph.</a:t>
+            </a:r>
+          </a:p>
+        </p:txBody>
+      </p:sp>
+      <p:sp>
+        <p:nvSpPr>
+          <p:cNvPr id="4" name="Slide Number Placeholder 3"/>
+          <p:cNvSpPr>
+            <a:spLocks noGrp="1"/>
+          </p:cNvSpPr>
+          <p:nvPr>
+            <p:ph type="sldNum" sz="quarter" idx="10"/>
+          </p:nvPr>
+        </p:nvSpPr>
+        <p:spPr/>
+        <p:txBody>
+          <a:bodyPr/>
+          <a:lstStyle/>
+          <a:p>
+            <a:fld id="{18BDFEC3-8487-43E8-A154-7C12CBC1FFF2}" type="slidenum">
+              <a:rPr lang="en-US"/>
+              <a:t>18</a:t>
+            </a:fld>
+            <a:endParaRPr lang="en-US"/>
+          </a:p>
+        </p:txBody>
+      </p:sp>
+    </p:spTree>
+  </p:cSld>
+</p:notes>
+</file>
+
+<file path=ppt/notesSlides/notesSlide17.xml><?xml version="1.0" encoding="utf-8"?>
+<p:notes xmlns:a="http://schemas.openxmlformats.org/drawingml/2006/main" xmlns:r="http://schemas.openxmlformats.org/officeDocument/2006/relationships" xmlns:p="http://schemas.openxmlformats.org/presentationml/2006/main">
+  <p:cSld>
+    <p:spTree>
+      <p:nvGrpSpPr>
+        <p:cNvPr id="1" name=""/>
+        <p:cNvGrpSpPr/>
+        <p:nvPr/>
+      </p:nvGrpSpPr>
+      <p:grpSpPr>
+        <a:xfrm>
+          <a:off x="0" y="0"/>
+          <a:ext cx="0" cy="0"/>
+          <a:chOff x="0" y="0"/>
+          <a:chExt cx="0" cy="0"/>
+        </a:xfrm>
+      </p:grpSpPr>
+      <p:sp>
+        <p:nvSpPr>
+          <p:cNvPr id="2" name="Slide Image Placeholder 1"/>
+          <p:cNvSpPr>
+            <a:spLocks noGrp="1" noRot="1" noChangeAspect="1"/>
+          </p:cNvSpPr>
+          <p:nvPr>
+            <p:ph type="sldImg"/>
+          </p:nvPr>
+        </p:nvSpPr>
+        <p:spPr/>
+      </p:sp>
+      <p:sp>
+        <p:nvSpPr>
+          <p:cNvPr id="3" name="Notes Placeholder 2"/>
+          <p:cNvSpPr>
+            <a:spLocks noGrp="1"/>
+          </p:cNvSpPr>
+          <p:nvPr>
+            <p:ph type="body" idx="1"/>
+          </p:nvPr>
+        </p:nvSpPr>
+        <p:spPr/>
+        <p:txBody>
+          <a:bodyPr/>
+          <a:lstStyle/>
+          <a:p>
+            <a:pPr lvl="0" marL="0" indent="0">
+              <a:buNone/>
+            </a:pPr>
+            <a:r>
+              <a:rPr/>
+              <a:t>This</a:t>
+            </a:r>
+            <a:r>
+              <a:rPr/>
+              <a:t> </a:t>
+            </a:r>
+            <a:r>
+              <a:rPr/>
+              <a:t>graph</a:t>
+            </a:r>
+            <a:r>
+              <a:rPr/>
+              <a:t> </a:t>
+            </a:r>
+            <a:r>
+              <a:rPr/>
+              <a:t>has</a:t>
+            </a:r>
+            <a:r>
+              <a:rPr/>
+              <a:t> </a:t>
+            </a:r>
+            <a:r>
+              <a:rPr/>
+              <a:t>an</a:t>
+            </a:r>
+            <a:r>
+              <a:rPr/>
+              <a:t> </a:t>
+            </a:r>
+            <a:r>
+              <a:rPr/>
+              <a:t>aspect</a:t>
+            </a:r>
+            <a:r>
+              <a:rPr/>
+              <a:t> </a:t>
+            </a:r>
+            <a:r>
+              <a:rPr/>
+              <a:t>ratio</a:t>
+            </a:r>
+            <a:r>
+              <a:rPr/>
+              <a:t> </a:t>
+            </a:r>
+            <a:r>
+              <a:rPr/>
+              <a:t>of</a:t>
+            </a:r>
+            <a:r>
+              <a:rPr/>
+              <a:t> </a:t>
+            </a:r>
+            <a:r>
+              <a:rPr/>
+              <a:t>1</a:t>
+            </a:r>
+            <a:r>
+              <a:rPr/>
+              <a:t> </a:t>
+            </a:r>
+            <a:r>
+              <a:rPr/>
+              <a:t>to</a:t>
+            </a:r>
+            <a:r>
+              <a:rPr/>
+              <a:t> </a:t>
+            </a:r>
+            <a:r>
+              <a:rPr/>
+              <a:t>2.</a:t>
+            </a:r>
+            <a:r>
+              <a:rPr/>
+              <a:t> </a:t>
+            </a:r>
+            <a:r>
+              <a:rPr/>
+              <a:t>It</a:t>
+            </a:r>
+            <a:r>
+              <a:rPr/>
+              <a:t> </a:t>
+            </a:r>
+            <a:r>
+              <a:rPr/>
+              <a:t>is</a:t>
+            </a:r>
+            <a:r>
+              <a:rPr/>
+              <a:t> </a:t>
+            </a:r>
+            <a:r>
+              <a:rPr/>
+              <a:t>twice</a:t>
+            </a:r>
+            <a:r>
+              <a:rPr/>
+              <a:t> </a:t>
+            </a:r>
+            <a:r>
+              <a:rPr/>
+              <a:t>as</a:t>
+            </a:r>
+            <a:r>
+              <a:rPr/>
+              <a:t> </a:t>
+            </a:r>
+            <a:r>
+              <a:rPr/>
+              <a:t>tall</a:t>
+            </a:r>
+            <a:r>
+              <a:rPr/>
+              <a:t> </a:t>
+            </a:r>
+            <a:r>
+              <a:rPr/>
+              <a:t>as</a:t>
+            </a:r>
+            <a:r>
+              <a:rPr/>
+              <a:t> </a:t>
+            </a:r>
+            <a:r>
+              <a:rPr/>
+              <a:t>it</a:t>
+            </a:r>
+            <a:r>
+              <a:rPr/>
+              <a:t> </a:t>
+            </a:r>
+            <a:r>
+              <a:rPr/>
+              <a:t>is</a:t>
+            </a:r>
+            <a:r>
+              <a:rPr/>
+              <a:t> </a:t>
+            </a:r>
+            <a:r>
+              <a:rPr/>
+              <a:t>wide.</a:t>
+            </a:r>
+            <a:r>
+              <a:rPr/>
+              <a:t> </a:t>
+            </a:r>
+            <a:r>
+              <a:rPr/>
+              <a:t>Which</a:t>
+            </a:r>
+            <a:r>
+              <a:rPr/>
+              <a:t> </a:t>
+            </a:r>
+            <a:r>
+              <a:rPr/>
+              <a:t>one</a:t>
+            </a:r>
+            <a:r>
+              <a:rPr/>
+              <a:t> </a:t>
+            </a:r>
+            <a:r>
+              <a:rPr/>
+              <a:t>is</a:t>
+            </a:r>
+            <a:r>
+              <a:rPr/>
+              <a:t> </a:t>
+            </a:r>
+            <a:r>
+              <a:rPr/>
+              <a:t>better?</a:t>
+            </a:r>
+          </a:p>
+        </p:txBody>
+      </p:sp>
+      <p:sp>
+        <p:nvSpPr>
+          <p:cNvPr id="4" name="Slide Number Placeholder 3"/>
+          <p:cNvSpPr>
+            <a:spLocks noGrp="1"/>
+          </p:cNvSpPr>
+          <p:nvPr>
+            <p:ph type="sldNum" sz="quarter" idx="10"/>
+          </p:nvPr>
+        </p:nvSpPr>
+        <p:spPr/>
+        <p:txBody>
+          <a:bodyPr/>
+          <a:lstStyle/>
+          <a:p>
+            <a:fld id="{18BDFEC3-8487-43E8-A154-7C12CBC1FFF2}" type="slidenum">
+              <a:rPr lang="en-US"/>
+              <a:t>19</a:t>
             </a:fld>
             <a:endParaRPr lang="en-US"/>
           </a:p>
@@ -15507,7 +16048,7 @@
           <p:nvPr/>
         </p:nvPicPr>
         <p:blipFill>
-          <a:blip r:embed="rId2"/>
+          <a:blip r:embed="rId3"/>
           <a:stretch>
             <a:fillRect/>
           </a:stretch>
@@ -15553,63 +16094,47 @@
             </a:pPr>
             <a:r>
               <a:rPr/>
-              <a:t>Boxplot</a:t>
-            </a:r>
-            <a:r>
-              <a:rPr/>
-              <a:t> </a:t>
-            </a:r>
-            <a:r>
-              <a:rPr/>
-              <a:t>of</a:t>
-            </a:r>
-            <a:r>
-              <a:rPr/>
-              <a:t> </a:t>
-            </a:r>
-            <a:r>
-              <a:rPr/>
-              <a:t>house</a:t>
-            </a:r>
-            <a:r>
-              <a:rPr/>
-              <a:t> </a:t>
-            </a:r>
-            <a:r>
-              <a:rPr/>
-              <a:t>prices</a:t>
-            </a:r>
-            <a:r>
-              <a:rPr/>
-              <a:t> </a:t>
-            </a:r>
-            <a:r>
-              <a:rPr/>
-              <a:t>by</a:t>
-            </a:r>
-            <a:r>
-              <a:rPr/>
-              <a:t> </a:t>
-            </a:r>
-            <a:r>
-              <a:rPr/>
-              <a:t>number</a:t>
-            </a:r>
-            <a:r>
-              <a:rPr/>
-              <a:t> </a:t>
-            </a:r>
-            <a:r>
-              <a:rPr/>
-              <a:t>of</a:t>
-            </a:r>
-            <a:r>
-              <a:rPr/>
-              <a:t> </a:t>
-            </a:r>
-            <a:r>
-              <a:rPr/>
-              <a:t>bedrooms</a:t>
+              <a:t>Scatterplot</a:t>
+            </a:r>
+            <a:r>
+              <a:rPr/>
+              <a:t> </a:t>
+            </a:r>
+            <a:r>
+              <a:rPr/>
+              <a:t>with</a:t>
+            </a:r>
+            <a:r>
+              <a:rPr/>
+              <a:t> </a:t>
+            </a:r>
+            <a:r>
+              <a:rPr/>
+              <a:t>a</a:t>
+            </a:r>
+            <a:r>
+              <a:rPr/>
+              <a:t> </a:t>
+            </a:r>
+            <a:r>
+              <a:rPr/>
+              <a:t>2:1</a:t>
+            </a:r>
+            <a:r>
+              <a:rPr/>
+              <a:t> </a:t>
+            </a:r>
+            <a:r>
+              <a:rPr/>
+              <a:t>aspect</a:t>
+            </a:r>
+            <a:r>
+              <a:rPr/>
+              <a:t> </a:t>
+            </a:r>
+            <a:r>
+              <a:rPr/>
+              <a:t>ratio</a:t>
             </a:r>
           </a:p>
         </p:txBody>
@@ -15694,7 +16219,7 @@
           <p:nvPr/>
         </p:nvPicPr>
         <p:blipFill>
-          <a:blip r:embed="rId2"/>
+          <a:blip r:embed="rId3"/>
           <a:stretch>
             <a:fillRect/>
           </a:stretch>
@@ -15740,63 +16265,47 @@
             </a:pPr>
             <a:r>
               <a:rPr/>
-              <a:t>Boxplot</a:t>
-            </a:r>
-            <a:r>
-              <a:rPr/>
-              <a:t> </a:t>
-            </a:r>
-            <a:r>
-              <a:rPr/>
-              <a:t>of</a:t>
-            </a:r>
-            <a:r>
-              <a:rPr/>
-              <a:t> </a:t>
-            </a:r>
-            <a:r>
-              <a:rPr/>
-              <a:t>house</a:t>
-            </a:r>
-            <a:r>
-              <a:rPr/>
-              <a:t> </a:t>
-            </a:r>
-            <a:r>
-              <a:rPr/>
-              <a:t>prices</a:t>
-            </a:r>
-            <a:r>
-              <a:rPr/>
-              <a:t> </a:t>
-            </a:r>
-            <a:r>
-              <a:rPr/>
-              <a:t>by</a:t>
-            </a:r>
-            <a:r>
-              <a:rPr/>
-              <a:t> </a:t>
-            </a:r>
-            <a:r>
-              <a:rPr/>
-              <a:t>number</a:t>
-            </a:r>
-            <a:r>
-              <a:rPr/>
-              <a:t> </a:t>
-            </a:r>
-            <a:r>
-              <a:rPr/>
-              <a:t>of</a:t>
-            </a:r>
-            <a:r>
-              <a:rPr/>
-              <a:t> </a:t>
-            </a:r>
-            <a:r>
-              <a:rPr/>
-              <a:t>bedrooms</a:t>
+              <a:t>Scatterplot</a:t>
+            </a:r>
+            <a:r>
+              <a:rPr/>
+              <a:t> </a:t>
+            </a:r>
+            <a:r>
+              <a:rPr/>
+              <a:t>with</a:t>
+            </a:r>
+            <a:r>
+              <a:rPr/>
+              <a:t> </a:t>
+            </a:r>
+            <a:r>
+              <a:rPr/>
+              <a:t>a</a:t>
+            </a:r>
+            <a:r>
+              <a:rPr/>
+              <a:t> </a:t>
+            </a:r>
+            <a:r>
+              <a:rPr/>
+              <a:t>1:2</a:t>
+            </a:r>
+            <a:r>
+              <a:rPr/>
+              <a:t> </a:t>
+            </a:r>
+            <a:r>
+              <a:rPr/>
+              <a:t>aspect</a:t>
+            </a:r>
+            <a:r>
+              <a:rPr/>
+              <a:t> </a:t>
+            </a:r>
+            <a:r>
+              <a:rPr/>
+              <a:t>ratio</a:t>
             </a:r>
           </a:p>
         </p:txBody>
@@ -15976,7 +16485,15 @@
             </a:pPr>
             <a:r>
               <a:rPr/>
-              <a:t>Recommendations,</a:t>
+              <a:t>Recommendations</a:t>
+            </a:r>
+            <a:r>
+              <a:rPr/>
+              <a:t> </a:t>
+            </a:r>
+            <a:r>
+              <a:rPr/>
+              <a:t>for</a:t>
             </a:r>
             <a:r>
               <a:rPr/>
@@ -16015,18 +16532,202 @@
             <a:pPr lvl="1"/>
             <a:r>
               <a:rPr/>
-              <a:t>Recommendations, square graphs</a:t>
+              <a:t>When changes in slope are important</a:t>
+            </a:r>
+          </a:p>
+          <a:p>
+            <a:pPr lvl="2"/>
+            <a:r>
+              <a:rPr/>
+              <a:t>Very flat lines (angle close to zero) are difficult to compare</a:t>
+            </a:r>
+          </a:p>
+          <a:p>
+            <a:pPr lvl="2"/>
+            <a:r>
+              <a:rPr/>
+              <a:t>Very steep lines (angle close to plus or minus 90 degrees) are also difficult to compare</a:t>
+            </a:r>
+          </a:p>
+          <a:p>
+            <a:pPr lvl="2"/>
+            <a:r>
+              <a:rPr/>
+              <a:t>Size your graph so that most lines have angles of plus or minus 45 degrees.</a:t>
             </a:r>
           </a:p>
           <a:p>
             <a:pPr lvl="1"/>
             <a:r>
               <a:rPr/>
-              <a:t>Recommendations, sort your data or hope that your software does</a:t>
+              <a:t>Use square graph when comparing measurements of the same thing</a:t>
+            </a:r>
+          </a:p>
+          <a:p>
+            <a:pPr lvl="2"/>
+            <a:r>
+              <a:rPr/>
+              <a:t>Predicted versus actual</a:t>
+            </a:r>
+          </a:p>
+          <a:p>
+            <a:pPr lvl="2"/>
+            <a:r>
+              <a:rPr/>
+              <a:t>New lab method versus gold standard method</a:t>
             </a:r>
           </a:p>
         </p:txBody>
       </p:sp>
+    </p:spTree>
+  </p:cSld>
+</p:sld>
+</file>
+
+<file path=ppt/slides/slide21.xml><?xml version="1.0" encoding="utf-8"?>
+<p:sld xmlns:a="http://schemas.openxmlformats.org/drawingml/2006/main" xmlns:r="http://schemas.openxmlformats.org/officeDocument/2006/relationships" xmlns:p="http://schemas.openxmlformats.org/presentationml/2006/main">
+  <p:cSld>
+    <p:spTree>
+      <p:nvGrpSpPr>
+        <p:cNvPr id="1" name=""/>
+        <p:cNvGrpSpPr/>
+        <p:nvPr/>
+      </p:nvGrpSpPr>
+      <p:grpSpPr>
+        <a:xfrm>
+          <a:off x="0" y="0"/>
+          <a:ext cx="0" cy="0"/>
+          <a:chOff x="0" y="0"/>
+          <a:chExt cx="0" cy="0"/>
+        </a:xfrm>
+      </p:grpSpPr>
+      <p:sp>
+        <p:nvSpPr>
+          <p:cNvPr id="2" name="Title 1"/>
+          <p:cNvSpPr>
+            <a:spLocks noGrp="1"/>
+          </p:cNvSpPr>
+          <p:nvPr>
+            <p:ph type="title"/>
+          </p:nvPr>
+        </p:nvSpPr>
+        <p:spPr/>
+        <p:txBody>
+          <a:bodyPr/>
+          <a:lstStyle/>
+          <a:p>
+            <a:pPr lvl="0" marL="0" indent="0">
+              <a:buNone/>
+            </a:pPr>
+            <a:r>
+              <a:rPr/>
+              <a:t>Recommendations,</a:t>
+            </a:r>
+            <a:r>
+              <a:rPr/>
+              <a:t> </a:t>
+            </a:r>
+            <a:r>
+              <a:rPr/>
+              <a:t>sort</a:t>
+            </a:r>
+            <a:r>
+              <a:rPr/>
+              <a:t> </a:t>
+            </a:r>
+            <a:r>
+              <a:rPr/>
+              <a:t>your</a:t>
+            </a:r>
+            <a:r>
+              <a:rPr/>
+              <a:t> </a:t>
+            </a:r>
+            <a:r>
+              <a:rPr/>
+              <a:t>data</a:t>
+            </a:r>
+            <a:r>
+              <a:rPr/>
+              <a:t> </a:t>
+            </a:r>
+            <a:r>
+              <a:rPr/>
+              <a:t>or</a:t>
+            </a:r>
+            <a:r>
+              <a:rPr/>
+              <a:t> </a:t>
+            </a:r>
+            <a:r>
+              <a:rPr/>
+              <a:t>hope</a:t>
+            </a:r>
+            <a:r>
+              <a:rPr/>
+              <a:t> </a:t>
+            </a:r>
+            <a:r>
+              <a:rPr/>
+              <a:t>that</a:t>
+            </a:r>
+            <a:r>
+              <a:rPr/>
+              <a:t> </a:t>
+            </a:r>
+            <a:r>
+              <a:rPr/>
+              <a:t>your</a:t>
+            </a:r>
+            <a:r>
+              <a:rPr/>
+              <a:t> </a:t>
+            </a:r>
+            <a:r>
+              <a:rPr/>
+              <a:t>software</a:t>
+            </a:r>
+            <a:r>
+              <a:rPr/>
+              <a:t> </a:t>
+            </a:r>
+            <a:r>
+              <a:rPr/>
+              <a:t>does</a:t>
+            </a:r>
+          </a:p>
+        </p:txBody>
+      </p:sp>
+      <p:pic>
+        <p:nvPicPr>
+          <p:cNvPr descr="../images/r/ragged-path.png" id="0" name="Picture 1"/>
+          <p:cNvPicPr>
+            <a:picLocks noGrp="1" noChangeAspect="1"/>
+          </p:cNvPicPr>
+          <p:nvPr/>
+        </p:nvPicPr>
+        <p:blipFill>
+          <a:blip r:embed="rId2"/>
+          <a:stretch>
+            <a:fillRect/>
+          </a:stretch>
+        </p:blipFill>
+        <p:spPr bwMode="auto">
+          <a:xfrm>
+            <a:off x="2311400" y="1600200"/>
+            <a:ext cx="4521200" cy="4521200"/>
+          </a:xfrm>
+          <a:prstGeom prst="rect">
+            <a:avLst/>
+          </a:prstGeom>
+          <a:noFill/>
+          <a:ln w="9525">
+            <a:noFill/>
+            <a:headEnd/>
+            <a:tailEnd/>
+          </a:ln>
+        </p:spPr>
+      </p:pic>
     </p:spTree>
   </p:cSld>
 </p:sld>

</xml_diff>